<commit_message>
cropped high-level concept figure
</commit_message>
<xml_diff>
--- a/doc/high-level.pptx
+++ b/doc/high-level.pptx
@@ -105,6 +105,11 @@
       </a:defRPr>
     </a:lvl9pPr>
   </p:defaultTextStyle>
+  <p:extLst>
+    <p:ext uri="{EFAFB233-063F-42B5-8137-9DF3F51BA10A}">
+      <p15:sldGuideLst xmlns:p15="http://schemas.microsoft.com/office/powerpoint/2012/main"/>
+    </p:ext>
+  </p:extLst>
 </p:presentation>
 </file>
 
@@ -3579,7 +3584,7 @@
         </p:nvSpPr>
         <p:spPr>
           <a:xfrm>
-            <a:off x="2055046" y="3044857"/>
+            <a:off x="2055046" y="3440780"/>
             <a:ext cx="829559" cy="820132"/>
           </a:xfrm>
           <a:prstGeom prst="cube">
@@ -3626,7 +3631,7 @@
         </p:nvSpPr>
         <p:spPr>
           <a:xfrm>
-            <a:off x="1875936" y="2403835"/>
+            <a:off x="1875936" y="2799758"/>
             <a:ext cx="1187777" cy="369332"/>
           </a:xfrm>
           <a:prstGeom prst="rect">
@@ -3661,7 +3666,7 @@
         </p:nvSpPr>
         <p:spPr>
           <a:xfrm>
-            <a:off x="3954621" y="2403835"/>
+            <a:off x="3954621" y="2799758"/>
             <a:ext cx="647934" cy="369332"/>
           </a:xfrm>
           <a:prstGeom prst="rect">
@@ -3695,7 +3700,7 @@
         </p:nvSpPr>
         <p:spPr>
           <a:xfrm>
-            <a:off x="8869547" y="2034503"/>
+            <a:off x="8869547" y="2430426"/>
             <a:ext cx="1670650" cy="369332"/>
           </a:xfrm>
           <a:prstGeom prst="rect">
@@ -3729,7 +3734,7 @@
         </p:nvSpPr>
         <p:spPr>
           <a:xfrm>
-            <a:off x="5425949" y="2034503"/>
+            <a:off x="5425949" y="2430426"/>
             <a:ext cx="1322799" cy="369332"/>
           </a:xfrm>
           <a:prstGeom prst="rect">
@@ -3763,7 +3768,7 @@
         </p:nvSpPr>
         <p:spPr>
           <a:xfrm>
-            <a:off x="7229100" y="2034503"/>
+            <a:off x="7229100" y="2430426"/>
             <a:ext cx="1334020" cy="369332"/>
           </a:xfrm>
           <a:prstGeom prst="rect">
@@ -3797,7 +3802,7 @@
         </p:nvSpPr>
         <p:spPr>
           <a:xfrm>
-            <a:off x="4064042" y="1260741"/>
+            <a:off x="4061939" y="1296972"/>
             <a:ext cx="4063934" cy="584775"/>
           </a:xfrm>
           <a:prstGeom prst="rect">
@@ -3831,7 +3836,7 @@
         </p:nvSpPr>
         <p:spPr>
           <a:xfrm>
-            <a:off x="3863808" y="3044857"/>
+            <a:off x="3863808" y="3440780"/>
             <a:ext cx="829559" cy="820132"/>
           </a:xfrm>
           <a:prstGeom prst="cube">
@@ -3876,7 +3881,7 @@
         </p:nvSpPr>
         <p:spPr>
           <a:xfrm>
-            <a:off x="5672570" y="3044857"/>
+            <a:off x="5672570" y="3440780"/>
             <a:ext cx="829559" cy="820132"/>
           </a:xfrm>
           <a:prstGeom prst="cube">
@@ -3921,7 +3926,7 @@
         </p:nvSpPr>
         <p:spPr>
           <a:xfrm>
-            <a:off x="7481332" y="3044857"/>
+            <a:off x="7481332" y="3440780"/>
             <a:ext cx="829559" cy="820132"/>
           </a:xfrm>
           <a:prstGeom prst="cube">
@@ -3966,7 +3971,7 @@
         </p:nvSpPr>
         <p:spPr>
           <a:xfrm>
-            <a:off x="9290093" y="3044857"/>
+            <a:off x="9290093" y="3440780"/>
             <a:ext cx="829559" cy="820132"/>
           </a:xfrm>
           <a:prstGeom prst="cube">
@@ -4014,7 +4019,7 @@
         </p:nvCxnSpPr>
         <p:spPr>
           <a:xfrm>
-            <a:off x="8105858" y="3557440"/>
+            <a:off x="8105858" y="3953363"/>
             <a:ext cx="1184235" cy="0"/>
           </a:xfrm>
           <a:prstGeom prst="straightConnector1">
@@ -4050,7 +4055,7 @@
         </p:nvCxnSpPr>
         <p:spPr>
           <a:xfrm>
-            <a:off x="2679572" y="3557440"/>
+            <a:off x="2679572" y="3953363"/>
             <a:ext cx="1184236" cy="0"/>
           </a:xfrm>
           <a:prstGeom prst="straightConnector1">
@@ -4086,7 +4091,7 @@
         </p:nvCxnSpPr>
         <p:spPr>
           <a:xfrm>
-            <a:off x="4488334" y="3557440"/>
+            <a:off x="4488334" y="3953363"/>
             <a:ext cx="1184236" cy="0"/>
           </a:xfrm>
           <a:prstGeom prst="straightConnector1">
@@ -4122,7 +4127,7 @@
         </p:nvCxnSpPr>
         <p:spPr>
           <a:xfrm>
-            <a:off x="6297096" y="3557440"/>
+            <a:off x="6297096" y="3953363"/>
             <a:ext cx="1184236" cy="0"/>
           </a:xfrm>
           <a:prstGeom prst="straightConnector1">
@@ -4155,7 +4160,7 @@
         </p:nvSpPr>
         <p:spPr>
           <a:xfrm>
-            <a:off x="8721493" y="2403835"/>
+            <a:off x="8721493" y="2799758"/>
             <a:ext cx="1966757" cy="369332"/>
           </a:xfrm>
           <a:prstGeom prst="rect">
@@ -4189,7 +4194,7 @@
         </p:nvSpPr>
         <p:spPr>
           <a:xfrm>
-            <a:off x="7250164" y="2403835"/>
+            <a:off x="7250164" y="2799758"/>
             <a:ext cx="1291892" cy="369332"/>
           </a:xfrm>
           <a:prstGeom prst="rect">
@@ -4235,7 +4240,7 @@
         </p:nvSpPr>
         <p:spPr>
           <a:xfrm>
-            <a:off x="5648912" y="2403835"/>
+            <a:off x="5648912" y="2799758"/>
             <a:ext cx="889988" cy="369332"/>
           </a:xfrm>
           <a:prstGeom prst="rect">
@@ -4269,7 +4274,7 @@
         </p:nvSpPr>
         <p:spPr>
           <a:xfrm>
-            <a:off x="3917751" y="2034503"/>
+            <a:off x="3917751" y="2430426"/>
             <a:ext cx="721672" cy="369332"/>
           </a:xfrm>
           <a:prstGeom prst="rect">
@@ -4303,7 +4308,7 @@
         </p:nvSpPr>
         <p:spPr>
           <a:xfrm>
-            <a:off x="1878148" y="2034503"/>
+            <a:off x="1878148" y="2430426"/>
             <a:ext cx="1187777" cy="369332"/>
           </a:xfrm>
           <a:prstGeom prst="rect">

</xml_diff>

<commit_message>
Formatted Powerpoint. Added initial setup for import block
</commit_message>
<xml_diff>
--- a/doc/high-level.pptx
+++ b/doc/high-level.pptx
@@ -2,19 +2,23 @@
 <file path=ppt/presentation.xml><?xml version="1.0" encoding="utf-8"?>
 <p:presentation xmlns:a="http://schemas.openxmlformats.org/drawingml/2006/main" xmlns:r="http://schemas.openxmlformats.org/officeDocument/2006/relationships" xmlns:p="http://schemas.openxmlformats.org/presentationml/2006/main" saveSubsetFonts="1">
   <p:sldMasterIdLst>
-    <p:sldMasterId id="2147483648" r:id="rId1"/>
+    <p:sldMasterId id="2147483672" r:id="rId1"/>
   </p:sldMasterIdLst>
+  <p:notesMasterIdLst>
+    <p:notesMasterId r:id="rId5"/>
+  </p:notesMasterIdLst>
   <p:sldIdLst>
     <p:sldId id="257" r:id="rId2"/>
     <p:sldId id="258" r:id="rId3"/>
+    <p:sldId id="260" r:id="rId4"/>
   </p:sldIdLst>
-  <p:sldSz cx="12192000" cy="6858000"/>
+  <p:sldSz cx="9144000" cy="4572000"/>
   <p:notesSz cx="6858000" cy="9144000"/>
   <p:defaultTextStyle>
     <a:defPPr>
       <a:defRPr lang="en-US"/>
     </a:defPPr>
-    <a:lvl1pPr marL="0" algn="l" defTabSz="914400" rtl="0" eaLnBrk="1" latinLnBrk="0" hangingPunct="1">
+    <a:lvl1pPr marL="0" algn="l" defTabSz="914393" rtl="0" eaLnBrk="1" latinLnBrk="0" hangingPunct="1">
       <a:defRPr sz="1800" kern="1200">
         <a:solidFill>
           <a:schemeClr val="tx1"/>
@@ -24,7 +28,7 @@
         <a:cs typeface="+mn-cs"/>
       </a:defRPr>
     </a:lvl1pPr>
-    <a:lvl2pPr marL="457200" algn="l" defTabSz="914400" rtl="0" eaLnBrk="1" latinLnBrk="0" hangingPunct="1">
+    <a:lvl2pPr marL="457197" algn="l" defTabSz="914393" rtl="0" eaLnBrk="1" latinLnBrk="0" hangingPunct="1">
       <a:defRPr sz="1800" kern="1200">
         <a:solidFill>
           <a:schemeClr val="tx1"/>
@@ -34,7 +38,7 @@
         <a:cs typeface="+mn-cs"/>
       </a:defRPr>
     </a:lvl2pPr>
-    <a:lvl3pPr marL="914400" algn="l" defTabSz="914400" rtl="0" eaLnBrk="1" latinLnBrk="0" hangingPunct="1">
+    <a:lvl3pPr marL="914393" algn="l" defTabSz="914393" rtl="0" eaLnBrk="1" latinLnBrk="0" hangingPunct="1">
       <a:defRPr sz="1800" kern="1200">
         <a:solidFill>
           <a:schemeClr val="tx1"/>
@@ -44,7 +48,7 @@
         <a:cs typeface="+mn-cs"/>
       </a:defRPr>
     </a:lvl3pPr>
-    <a:lvl4pPr marL="1371600" algn="l" defTabSz="914400" rtl="0" eaLnBrk="1" latinLnBrk="0" hangingPunct="1">
+    <a:lvl4pPr marL="1371592" algn="l" defTabSz="914393" rtl="0" eaLnBrk="1" latinLnBrk="0" hangingPunct="1">
       <a:defRPr sz="1800" kern="1200">
         <a:solidFill>
           <a:schemeClr val="tx1"/>
@@ -54,7 +58,7 @@
         <a:cs typeface="+mn-cs"/>
       </a:defRPr>
     </a:lvl4pPr>
-    <a:lvl5pPr marL="1828800" algn="l" defTabSz="914400" rtl="0" eaLnBrk="1" latinLnBrk="0" hangingPunct="1">
+    <a:lvl5pPr marL="1828789" algn="l" defTabSz="914393" rtl="0" eaLnBrk="1" latinLnBrk="0" hangingPunct="1">
       <a:defRPr sz="1800" kern="1200">
         <a:solidFill>
           <a:schemeClr val="tx1"/>
@@ -64,7 +68,7 @@
         <a:cs typeface="+mn-cs"/>
       </a:defRPr>
     </a:lvl5pPr>
-    <a:lvl6pPr marL="2286000" algn="l" defTabSz="914400" rtl="0" eaLnBrk="1" latinLnBrk="0" hangingPunct="1">
+    <a:lvl6pPr marL="2285985" algn="l" defTabSz="914393" rtl="0" eaLnBrk="1" latinLnBrk="0" hangingPunct="1">
       <a:defRPr sz="1800" kern="1200">
         <a:solidFill>
           <a:schemeClr val="tx1"/>
@@ -74,7 +78,7 @@
         <a:cs typeface="+mn-cs"/>
       </a:defRPr>
     </a:lvl6pPr>
-    <a:lvl7pPr marL="2743200" algn="l" defTabSz="914400" rtl="0" eaLnBrk="1" latinLnBrk="0" hangingPunct="1">
+    <a:lvl7pPr marL="2743182" algn="l" defTabSz="914393" rtl="0" eaLnBrk="1" latinLnBrk="0" hangingPunct="1">
       <a:defRPr sz="1800" kern="1200">
         <a:solidFill>
           <a:schemeClr val="tx1"/>
@@ -84,7 +88,7 @@
         <a:cs typeface="+mn-cs"/>
       </a:defRPr>
     </a:lvl7pPr>
-    <a:lvl8pPr marL="3200400" algn="l" defTabSz="914400" rtl="0" eaLnBrk="1" latinLnBrk="0" hangingPunct="1">
+    <a:lvl8pPr marL="3200379" algn="l" defTabSz="914393" rtl="0" eaLnBrk="1" latinLnBrk="0" hangingPunct="1">
       <a:defRPr sz="1800" kern="1200">
         <a:solidFill>
           <a:schemeClr val="tx1"/>
@@ -94,7 +98,7 @@
         <a:cs typeface="+mn-cs"/>
       </a:defRPr>
     </a:lvl8pPr>
-    <a:lvl9pPr marL="3657600" algn="l" defTabSz="914400" rtl="0" eaLnBrk="1" latinLnBrk="0" hangingPunct="1">
+    <a:lvl9pPr marL="3657577" algn="l" defTabSz="914393" rtl="0" eaLnBrk="1" latinLnBrk="0" hangingPunct="1">
       <a:defRPr sz="1800" kern="1200">
         <a:solidFill>
           <a:schemeClr val="tx1"/>
@@ -111,6 +115,356 @@
     </p:ext>
   </p:extLst>
 </p:presentation>
+</file>
+
+<file path=ppt/notesMasters/notesMaster1.xml><?xml version="1.0" encoding="utf-8"?>
+<p:notesMaster xmlns:a="http://schemas.openxmlformats.org/drawingml/2006/main" xmlns:r="http://schemas.openxmlformats.org/officeDocument/2006/relationships" xmlns:p="http://schemas.openxmlformats.org/presentationml/2006/main">
+  <p:cSld>
+    <p:bg>
+      <p:bgRef idx="1001">
+        <a:schemeClr val="bg1"/>
+      </p:bgRef>
+    </p:bg>
+    <p:spTree>
+      <p:nvGrpSpPr>
+        <p:cNvPr id="1" name=""/>
+        <p:cNvGrpSpPr/>
+        <p:nvPr/>
+      </p:nvGrpSpPr>
+      <p:grpSpPr>
+        <a:xfrm>
+          <a:off x="0" y="0"/>
+          <a:ext cx="0" cy="0"/>
+          <a:chOff x="0" y="0"/>
+          <a:chExt cx="0" cy="0"/>
+        </a:xfrm>
+      </p:grpSpPr>
+      <p:sp>
+        <p:nvSpPr>
+          <p:cNvPr id="2" name="Header Placeholder 1"/>
+          <p:cNvSpPr>
+            <a:spLocks noGrp="1"/>
+          </p:cNvSpPr>
+          <p:nvPr>
+            <p:ph type="hdr" sz="quarter"/>
+          </p:nvPr>
+        </p:nvSpPr>
+        <p:spPr>
+          <a:xfrm>
+            <a:off x="0" y="0"/>
+            <a:ext cx="2971800" cy="458788"/>
+          </a:xfrm>
+          <a:prstGeom prst="rect">
+            <a:avLst/>
+          </a:prstGeom>
+        </p:spPr>
+        <p:txBody>
+          <a:bodyPr vert="horz" lIns="91440" tIns="45720" rIns="91440" bIns="45720" rtlCol="0"/>
+          <a:lstStyle>
+            <a:lvl1pPr algn="l">
+              <a:defRPr sz="1200"/>
+            </a:lvl1pPr>
+          </a:lstStyle>
+          <a:p>
+            <a:endParaRPr lang="en-US"/>
+          </a:p>
+        </p:txBody>
+      </p:sp>
+      <p:sp>
+        <p:nvSpPr>
+          <p:cNvPr id="3" name="Date Placeholder 2"/>
+          <p:cNvSpPr>
+            <a:spLocks noGrp="1"/>
+          </p:cNvSpPr>
+          <p:nvPr>
+            <p:ph type="dt" idx="1"/>
+          </p:nvPr>
+        </p:nvSpPr>
+        <p:spPr>
+          <a:xfrm>
+            <a:off x="3884613" y="0"/>
+            <a:ext cx="2971800" cy="458788"/>
+          </a:xfrm>
+          <a:prstGeom prst="rect">
+            <a:avLst/>
+          </a:prstGeom>
+        </p:spPr>
+        <p:txBody>
+          <a:bodyPr vert="horz" lIns="91440" tIns="45720" rIns="91440" bIns="45720" rtlCol="0"/>
+          <a:lstStyle>
+            <a:lvl1pPr algn="r">
+              <a:defRPr sz="1200"/>
+            </a:lvl1pPr>
+          </a:lstStyle>
+          <a:p>
+            <a:fld id="{DBEB2578-0F1C-4698-B673-BA05C5BFBFF2}" type="datetimeFigureOut">
+              <a:rPr lang="en-US" smtClean="0"/>
+              <a:t>6/6/2018</a:t>
+            </a:fld>
+            <a:endParaRPr lang="en-US"/>
+          </a:p>
+        </p:txBody>
+      </p:sp>
+      <p:sp>
+        <p:nvSpPr>
+          <p:cNvPr id="4" name="Slide Image Placeholder 3"/>
+          <p:cNvSpPr>
+            <a:spLocks noGrp="1" noRot="1" noChangeAspect="1"/>
+          </p:cNvSpPr>
+          <p:nvPr>
+            <p:ph type="sldImg" idx="2"/>
+          </p:nvPr>
+        </p:nvSpPr>
+        <p:spPr>
+          <a:xfrm>
+            <a:off x="342900" y="1143000"/>
+            <a:ext cx="6172200" cy="3086100"/>
+          </a:xfrm>
+          <a:prstGeom prst="rect">
+            <a:avLst/>
+          </a:prstGeom>
+          <a:noFill/>
+          <a:ln w="12700">
+            <a:solidFill>
+              <a:prstClr val="black"/>
+            </a:solidFill>
+          </a:ln>
+        </p:spPr>
+        <p:txBody>
+          <a:bodyPr vert="horz" lIns="91440" tIns="45720" rIns="91440" bIns="45720" rtlCol="0" anchor="ctr"/>
+          <a:lstStyle/>
+          <a:p>
+            <a:endParaRPr lang="en-US"/>
+          </a:p>
+        </p:txBody>
+      </p:sp>
+      <p:sp>
+        <p:nvSpPr>
+          <p:cNvPr id="5" name="Notes Placeholder 4"/>
+          <p:cNvSpPr>
+            <a:spLocks noGrp="1"/>
+          </p:cNvSpPr>
+          <p:nvPr>
+            <p:ph type="body" sz="quarter" idx="3"/>
+          </p:nvPr>
+        </p:nvSpPr>
+        <p:spPr>
+          <a:xfrm>
+            <a:off x="685800" y="4400550"/>
+            <a:ext cx="5486400" cy="3600450"/>
+          </a:xfrm>
+          <a:prstGeom prst="rect">
+            <a:avLst/>
+          </a:prstGeom>
+        </p:spPr>
+        <p:txBody>
+          <a:bodyPr vert="horz" lIns="91440" tIns="45720" rIns="91440" bIns="45720" rtlCol="0"/>
+          <a:lstStyle/>
+          <a:p>
+            <a:pPr lvl="0"/>
+            <a:r>
+              <a:rPr lang="en-US" smtClean="0"/>
+              <a:t>Click to edit Master text styles</a:t>
+            </a:r>
+          </a:p>
+          <a:p>
+            <a:pPr lvl="1"/>
+            <a:r>
+              <a:rPr lang="en-US" smtClean="0"/>
+              <a:t>Second level</a:t>
+            </a:r>
+          </a:p>
+          <a:p>
+            <a:pPr lvl="2"/>
+            <a:r>
+              <a:rPr lang="en-US" smtClean="0"/>
+              <a:t>Third level</a:t>
+            </a:r>
+          </a:p>
+          <a:p>
+            <a:pPr lvl="3"/>
+            <a:r>
+              <a:rPr lang="en-US" smtClean="0"/>
+              <a:t>Fourth level</a:t>
+            </a:r>
+          </a:p>
+          <a:p>
+            <a:pPr lvl="4"/>
+            <a:r>
+              <a:rPr lang="en-US" smtClean="0"/>
+              <a:t>Fifth level</a:t>
+            </a:r>
+            <a:endParaRPr lang="en-US"/>
+          </a:p>
+        </p:txBody>
+      </p:sp>
+      <p:sp>
+        <p:nvSpPr>
+          <p:cNvPr id="6" name="Footer Placeholder 5"/>
+          <p:cNvSpPr>
+            <a:spLocks noGrp="1"/>
+          </p:cNvSpPr>
+          <p:nvPr>
+            <p:ph type="ftr" sz="quarter" idx="4"/>
+          </p:nvPr>
+        </p:nvSpPr>
+        <p:spPr>
+          <a:xfrm>
+            <a:off x="0" y="8685213"/>
+            <a:ext cx="2971800" cy="458787"/>
+          </a:xfrm>
+          <a:prstGeom prst="rect">
+            <a:avLst/>
+          </a:prstGeom>
+        </p:spPr>
+        <p:txBody>
+          <a:bodyPr vert="horz" lIns="91440" tIns="45720" rIns="91440" bIns="45720" rtlCol="0" anchor="b"/>
+          <a:lstStyle>
+            <a:lvl1pPr algn="l">
+              <a:defRPr sz="1200"/>
+            </a:lvl1pPr>
+          </a:lstStyle>
+          <a:p>
+            <a:endParaRPr lang="en-US"/>
+          </a:p>
+        </p:txBody>
+      </p:sp>
+      <p:sp>
+        <p:nvSpPr>
+          <p:cNvPr id="7" name="Slide Number Placeholder 6"/>
+          <p:cNvSpPr>
+            <a:spLocks noGrp="1"/>
+          </p:cNvSpPr>
+          <p:nvPr>
+            <p:ph type="sldNum" sz="quarter" idx="5"/>
+          </p:nvPr>
+        </p:nvSpPr>
+        <p:spPr>
+          <a:xfrm>
+            <a:off x="3884613" y="8685213"/>
+            <a:ext cx="2971800" cy="458787"/>
+          </a:xfrm>
+          <a:prstGeom prst="rect">
+            <a:avLst/>
+          </a:prstGeom>
+        </p:spPr>
+        <p:txBody>
+          <a:bodyPr vert="horz" lIns="91440" tIns="45720" rIns="91440" bIns="45720" rtlCol="0" anchor="b"/>
+          <a:lstStyle>
+            <a:lvl1pPr algn="r">
+              <a:defRPr sz="1200"/>
+            </a:lvl1pPr>
+          </a:lstStyle>
+          <a:p>
+            <a:fld id="{10D2C96D-5B6E-4972-B5B1-9AFA75B956D2}" type="slidenum">
+              <a:rPr lang="en-US" smtClean="0"/>
+              <a:t>‹#›</a:t>
+            </a:fld>
+            <a:endParaRPr lang="en-US"/>
+          </a:p>
+        </p:txBody>
+      </p:sp>
+    </p:spTree>
+    <p:extLst>
+      <p:ext uri="{BB962C8B-B14F-4D97-AF65-F5344CB8AC3E}">
+        <p14:creationId xmlns:p14="http://schemas.microsoft.com/office/powerpoint/2010/main" val="2890758303"/>
+      </p:ext>
+    </p:extLst>
+  </p:cSld>
+  <p:clrMap bg1="lt1" tx1="dk1" bg2="lt2" tx2="dk2" accent1="accent1" accent2="accent2" accent3="accent3" accent4="accent4" accent5="accent5" accent6="accent6" hlink="hlink" folHlink="folHlink"/>
+  <p:notesStyle>
+    <a:lvl1pPr marL="0" algn="l" defTabSz="914393" rtl="0" eaLnBrk="1" latinLnBrk="0" hangingPunct="1">
+      <a:defRPr sz="1200" kern="1200">
+        <a:solidFill>
+          <a:schemeClr val="tx1"/>
+        </a:solidFill>
+        <a:latin typeface="+mn-lt"/>
+        <a:ea typeface="+mn-ea"/>
+        <a:cs typeface="+mn-cs"/>
+      </a:defRPr>
+    </a:lvl1pPr>
+    <a:lvl2pPr marL="457197" algn="l" defTabSz="914393" rtl="0" eaLnBrk="1" latinLnBrk="0" hangingPunct="1">
+      <a:defRPr sz="1200" kern="1200">
+        <a:solidFill>
+          <a:schemeClr val="tx1"/>
+        </a:solidFill>
+        <a:latin typeface="+mn-lt"/>
+        <a:ea typeface="+mn-ea"/>
+        <a:cs typeface="+mn-cs"/>
+      </a:defRPr>
+    </a:lvl2pPr>
+    <a:lvl3pPr marL="914393" algn="l" defTabSz="914393" rtl="0" eaLnBrk="1" latinLnBrk="0" hangingPunct="1">
+      <a:defRPr sz="1200" kern="1200">
+        <a:solidFill>
+          <a:schemeClr val="tx1"/>
+        </a:solidFill>
+        <a:latin typeface="+mn-lt"/>
+        <a:ea typeface="+mn-ea"/>
+        <a:cs typeface="+mn-cs"/>
+      </a:defRPr>
+    </a:lvl3pPr>
+    <a:lvl4pPr marL="1371592" algn="l" defTabSz="914393" rtl="0" eaLnBrk="1" latinLnBrk="0" hangingPunct="1">
+      <a:defRPr sz="1200" kern="1200">
+        <a:solidFill>
+          <a:schemeClr val="tx1"/>
+        </a:solidFill>
+        <a:latin typeface="+mn-lt"/>
+        <a:ea typeface="+mn-ea"/>
+        <a:cs typeface="+mn-cs"/>
+      </a:defRPr>
+    </a:lvl4pPr>
+    <a:lvl5pPr marL="1828789" algn="l" defTabSz="914393" rtl="0" eaLnBrk="1" latinLnBrk="0" hangingPunct="1">
+      <a:defRPr sz="1200" kern="1200">
+        <a:solidFill>
+          <a:schemeClr val="tx1"/>
+        </a:solidFill>
+        <a:latin typeface="+mn-lt"/>
+        <a:ea typeface="+mn-ea"/>
+        <a:cs typeface="+mn-cs"/>
+      </a:defRPr>
+    </a:lvl5pPr>
+    <a:lvl6pPr marL="2285985" algn="l" defTabSz="914393" rtl="0" eaLnBrk="1" latinLnBrk="0" hangingPunct="1">
+      <a:defRPr sz="1200" kern="1200">
+        <a:solidFill>
+          <a:schemeClr val="tx1"/>
+        </a:solidFill>
+        <a:latin typeface="+mn-lt"/>
+        <a:ea typeface="+mn-ea"/>
+        <a:cs typeface="+mn-cs"/>
+      </a:defRPr>
+    </a:lvl6pPr>
+    <a:lvl7pPr marL="2743182" algn="l" defTabSz="914393" rtl="0" eaLnBrk="1" latinLnBrk="0" hangingPunct="1">
+      <a:defRPr sz="1200" kern="1200">
+        <a:solidFill>
+          <a:schemeClr val="tx1"/>
+        </a:solidFill>
+        <a:latin typeface="+mn-lt"/>
+        <a:ea typeface="+mn-ea"/>
+        <a:cs typeface="+mn-cs"/>
+      </a:defRPr>
+    </a:lvl7pPr>
+    <a:lvl8pPr marL="3200379" algn="l" defTabSz="914393" rtl="0" eaLnBrk="1" latinLnBrk="0" hangingPunct="1">
+      <a:defRPr sz="1200" kern="1200">
+        <a:solidFill>
+          <a:schemeClr val="tx1"/>
+        </a:solidFill>
+        <a:latin typeface="+mn-lt"/>
+        <a:ea typeface="+mn-ea"/>
+        <a:cs typeface="+mn-cs"/>
+      </a:defRPr>
+    </a:lvl8pPr>
+    <a:lvl9pPr marL="3657577" algn="l" defTabSz="914393" rtl="0" eaLnBrk="1" latinLnBrk="0" hangingPunct="1">
+      <a:defRPr sz="1200" kern="1200">
+        <a:solidFill>
+          <a:schemeClr val="tx1"/>
+        </a:solidFill>
+        <a:latin typeface="+mn-lt"/>
+        <a:ea typeface="+mn-ea"/>
+        <a:cs typeface="+mn-cs"/>
+      </a:defRPr>
+    </a:lvl9pPr>
+  </p:notesStyle>
+</p:notesMaster>
 </file>
 
 <file path=ppt/slideLayouts/slideLayout1.xml><?xml version="1.0" encoding="utf-8"?>
@@ -142,15 +496,15 @@
         </p:nvSpPr>
         <p:spPr>
           <a:xfrm>
-            <a:off x="1524000" y="1122363"/>
-            <a:ext cx="9144000" cy="2387600"/>
+            <a:off x="1143000" y="748242"/>
+            <a:ext cx="6858000" cy="1591733"/>
           </a:xfrm>
         </p:spPr>
         <p:txBody>
           <a:bodyPr anchor="b"/>
           <a:lstStyle>
             <a:lvl1pPr algn="ctr">
-              <a:defRPr sz="6000"/>
+              <a:defRPr sz="4000"/>
             </a:lvl1pPr>
           </a:lstStyle>
           <a:p>
@@ -158,7 +512,7 @@
               <a:rPr lang="en-US" smtClean="0"/>
               <a:t>Click to edit Master title style</a:t>
             </a:r>
-            <a:endParaRPr lang="en-US"/>
+            <a:endParaRPr lang="en-US" dirty="0"/>
           </a:p>
         </p:txBody>
       </p:sp>
@@ -174,8 +528,8 @@
         </p:nvSpPr>
         <p:spPr>
           <a:xfrm>
-            <a:off x="1524000" y="3602038"/>
-            <a:ext cx="9144000" cy="1655762"/>
+            <a:off x="1143000" y="2401359"/>
+            <a:ext cx="6858000" cy="1103841"/>
           </a:xfrm>
         </p:spPr>
         <p:txBody>
@@ -183,39 +537,39 @@
           <a:lstStyle>
             <a:lvl1pPr marL="0" indent="0" algn="ctr">
               <a:buNone/>
-              <a:defRPr sz="2400"/>
+              <a:defRPr sz="1600"/>
             </a:lvl1pPr>
-            <a:lvl2pPr marL="457200" indent="0" algn="ctr">
-              <a:buNone/>
-              <a:defRPr sz="2000"/>
+            <a:lvl2pPr marL="304815" indent="0" algn="ctr">
+              <a:buNone/>
+              <a:defRPr sz="1333"/>
             </a:lvl2pPr>
-            <a:lvl3pPr marL="914400" indent="0" algn="ctr">
-              <a:buNone/>
-              <a:defRPr sz="1800"/>
+            <a:lvl3pPr marL="609630" indent="0" algn="ctr">
+              <a:buNone/>
+              <a:defRPr sz="1200"/>
             </a:lvl3pPr>
-            <a:lvl4pPr marL="1371600" indent="0" algn="ctr">
-              <a:buNone/>
-              <a:defRPr sz="1600"/>
+            <a:lvl4pPr marL="914446" indent="0" algn="ctr">
+              <a:buNone/>
+              <a:defRPr sz="1067"/>
             </a:lvl4pPr>
-            <a:lvl5pPr marL="1828800" indent="0" algn="ctr">
-              <a:buNone/>
-              <a:defRPr sz="1600"/>
+            <a:lvl5pPr marL="1219261" indent="0" algn="ctr">
+              <a:buNone/>
+              <a:defRPr sz="1067"/>
             </a:lvl5pPr>
-            <a:lvl6pPr marL="2286000" indent="0" algn="ctr">
-              <a:buNone/>
-              <a:defRPr sz="1600"/>
+            <a:lvl6pPr marL="1524076" indent="0" algn="ctr">
+              <a:buNone/>
+              <a:defRPr sz="1067"/>
             </a:lvl6pPr>
-            <a:lvl7pPr marL="2743200" indent="0" algn="ctr">
-              <a:buNone/>
-              <a:defRPr sz="1600"/>
+            <a:lvl7pPr marL="1828891" indent="0" algn="ctr">
+              <a:buNone/>
+              <a:defRPr sz="1067"/>
             </a:lvl7pPr>
-            <a:lvl8pPr marL="3200400" indent="0" algn="ctr">
-              <a:buNone/>
-              <a:defRPr sz="1600"/>
+            <a:lvl8pPr marL="2133707" indent="0" algn="ctr">
+              <a:buNone/>
+              <a:defRPr sz="1067"/>
             </a:lvl8pPr>
-            <a:lvl9pPr marL="3657600" indent="0" algn="ctr">
-              <a:buNone/>
-              <a:defRPr sz="1600"/>
+            <a:lvl9pPr marL="2438522" indent="0" algn="ctr">
+              <a:buNone/>
+              <a:defRPr sz="1067"/>
             </a:lvl9pPr>
           </a:lstStyle>
           <a:p>
@@ -223,7 +577,7 @@
               <a:rPr lang="en-US" smtClean="0"/>
               <a:t>Click to edit Master subtitle style</a:t>
             </a:r>
-            <a:endParaRPr lang="en-US"/>
+            <a:endParaRPr lang="en-US" dirty="0"/>
           </a:p>
         </p:txBody>
       </p:sp>
@@ -244,7 +598,7 @@
           <a:p>
             <a:fld id="{5C2F6762-7B27-4D78-B4B8-E61606A5A872}" type="datetimeFigureOut">
               <a:rPr lang="en-US" smtClean="0"/>
-              <a:t>6/4/2018</a:t>
+              <a:t>6/6/2018</a:t>
             </a:fld>
             <a:endParaRPr lang="en-US"/>
           </a:p>
@@ -295,7 +649,7 @@
     </p:spTree>
     <p:extLst>
       <p:ext uri="{BB962C8B-B14F-4D97-AF65-F5344CB8AC3E}">
-        <p14:creationId xmlns:p14="http://schemas.microsoft.com/office/powerpoint/2010/main" val="76280428"/>
+        <p14:creationId xmlns:p14="http://schemas.microsoft.com/office/powerpoint/2010/main" val="532010689"/>
       </p:ext>
     </p:extLst>
   </p:cSld>
@@ -341,7 +695,7 @@
               <a:rPr lang="en-US" smtClean="0"/>
               <a:t>Click to edit Master title style</a:t>
             </a:r>
-            <a:endParaRPr lang="en-US"/>
+            <a:endParaRPr lang="en-US" dirty="0"/>
           </a:p>
         </p:txBody>
       </p:sp>
@@ -393,7 +747,7 @@
               <a:rPr lang="en-US" smtClean="0"/>
               <a:t>Fifth level</a:t>
             </a:r>
-            <a:endParaRPr lang="en-US"/>
+            <a:endParaRPr lang="en-US" dirty="0"/>
           </a:p>
         </p:txBody>
       </p:sp>
@@ -414,7 +768,7 @@
           <a:p>
             <a:fld id="{5C2F6762-7B27-4D78-B4B8-E61606A5A872}" type="datetimeFigureOut">
               <a:rPr lang="en-US" smtClean="0"/>
-              <a:t>6/4/2018</a:t>
+              <a:t>6/6/2018</a:t>
             </a:fld>
             <a:endParaRPr lang="en-US"/>
           </a:p>
@@ -465,7 +819,7 @@
     </p:spTree>
     <p:extLst>
       <p:ext uri="{BB962C8B-B14F-4D97-AF65-F5344CB8AC3E}">
-        <p14:creationId xmlns:p14="http://schemas.microsoft.com/office/powerpoint/2010/main" val="484884601"/>
+        <p14:creationId xmlns:p14="http://schemas.microsoft.com/office/powerpoint/2010/main" val="2742003017"/>
       </p:ext>
     </p:extLst>
   </p:cSld>
@@ -504,8 +858,8 @@
         </p:nvSpPr>
         <p:spPr>
           <a:xfrm>
-            <a:off x="8724900" y="365125"/>
-            <a:ext cx="2628900" cy="5811838"/>
+            <a:off x="6543675" y="243417"/>
+            <a:ext cx="1971675" cy="3874559"/>
           </a:xfrm>
         </p:spPr>
         <p:txBody>
@@ -516,7 +870,7 @@
               <a:rPr lang="en-US" smtClean="0"/>
               <a:t>Click to edit Master title style</a:t>
             </a:r>
-            <a:endParaRPr lang="en-US"/>
+            <a:endParaRPr lang="en-US" dirty="0"/>
           </a:p>
         </p:txBody>
       </p:sp>
@@ -532,8 +886,8 @@
         </p:nvSpPr>
         <p:spPr>
           <a:xfrm>
-            <a:off x="838200" y="365125"/>
-            <a:ext cx="7734300" cy="5811838"/>
+            <a:off x="628650" y="243417"/>
+            <a:ext cx="5800725" cy="3874559"/>
           </a:xfrm>
         </p:spPr>
         <p:txBody>
@@ -573,7 +927,7 @@
               <a:rPr lang="en-US" smtClean="0"/>
               <a:t>Fifth level</a:t>
             </a:r>
-            <a:endParaRPr lang="en-US"/>
+            <a:endParaRPr lang="en-US" dirty="0"/>
           </a:p>
         </p:txBody>
       </p:sp>
@@ -594,7 +948,7 @@
           <a:p>
             <a:fld id="{5C2F6762-7B27-4D78-B4B8-E61606A5A872}" type="datetimeFigureOut">
               <a:rPr lang="en-US" smtClean="0"/>
-              <a:t>6/4/2018</a:t>
+              <a:t>6/6/2018</a:t>
             </a:fld>
             <a:endParaRPr lang="en-US"/>
           </a:p>
@@ -645,7 +999,7 @@
     </p:spTree>
     <p:extLst>
       <p:ext uri="{BB962C8B-B14F-4D97-AF65-F5344CB8AC3E}">
-        <p14:creationId xmlns:p14="http://schemas.microsoft.com/office/powerpoint/2010/main" val="3450245187"/>
+        <p14:creationId xmlns:p14="http://schemas.microsoft.com/office/powerpoint/2010/main" val="3909872337"/>
       </p:ext>
     </p:extLst>
   </p:cSld>
@@ -691,7 +1045,7 @@
               <a:rPr lang="en-US" smtClean="0"/>
               <a:t>Click to edit Master title style</a:t>
             </a:r>
-            <a:endParaRPr lang="en-US"/>
+            <a:endParaRPr lang="en-US" dirty="0"/>
           </a:p>
         </p:txBody>
       </p:sp>
@@ -743,7 +1097,7 @@
               <a:rPr lang="en-US" smtClean="0"/>
               <a:t>Fifth level</a:t>
             </a:r>
-            <a:endParaRPr lang="en-US"/>
+            <a:endParaRPr lang="en-US" dirty="0"/>
           </a:p>
         </p:txBody>
       </p:sp>
@@ -764,7 +1118,7 @@
           <a:p>
             <a:fld id="{5C2F6762-7B27-4D78-B4B8-E61606A5A872}" type="datetimeFigureOut">
               <a:rPr lang="en-US" smtClean="0"/>
-              <a:t>6/4/2018</a:t>
+              <a:t>6/6/2018</a:t>
             </a:fld>
             <a:endParaRPr lang="en-US"/>
           </a:p>
@@ -815,7 +1169,7 @@
     </p:spTree>
     <p:extLst>
       <p:ext uri="{BB962C8B-B14F-4D97-AF65-F5344CB8AC3E}">
-        <p14:creationId xmlns:p14="http://schemas.microsoft.com/office/powerpoint/2010/main" val="3396339892"/>
+        <p14:creationId xmlns:p14="http://schemas.microsoft.com/office/powerpoint/2010/main" val="1282595357"/>
       </p:ext>
     </p:extLst>
   </p:cSld>
@@ -854,15 +1208,15 @@
         </p:nvSpPr>
         <p:spPr>
           <a:xfrm>
-            <a:off x="831850" y="1709738"/>
-            <a:ext cx="10515600" cy="2852737"/>
+            <a:off x="623888" y="1139826"/>
+            <a:ext cx="7886700" cy="1901825"/>
           </a:xfrm>
         </p:spPr>
         <p:txBody>
           <a:bodyPr anchor="b"/>
           <a:lstStyle>
             <a:lvl1pPr>
-              <a:defRPr sz="6000"/>
+              <a:defRPr sz="4000"/>
             </a:lvl1pPr>
           </a:lstStyle>
           <a:p>
@@ -870,7 +1224,7 @@
               <a:rPr lang="en-US" smtClean="0"/>
               <a:t>Click to edit Master title style</a:t>
             </a:r>
-            <a:endParaRPr lang="en-US"/>
+            <a:endParaRPr lang="en-US" dirty="0"/>
           </a:p>
         </p:txBody>
       </p:sp>
@@ -886,8 +1240,8 @@
         </p:nvSpPr>
         <p:spPr>
           <a:xfrm>
-            <a:off x="831850" y="4589463"/>
-            <a:ext cx="10515600" cy="1500187"/>
+            <a:off x="623888" y="3059642"/>
+            <a:ext cx="7886700" cy="1000125"/>
           </a:xfrm>
         </p:spPr>
         <p:txBody>
@@ -895,7 +1249,7 @@
           <a:lstStyle>
             <a:lvl1pPr marL="0" indent="0">
               <a:buNone/>
-              <a:defRPr sz="2400">
+              <a:defRPr sz="1600">
                 <a:solidFill>
                   <a:schemeClr val="tx1">
                     <a:tint val="75000"/>
@@ -903,9 +1257,9 @@
                 </a:solidFill>
               </a:defRPr>
             </a:lvl1pPr>
-            <a:lvl2pPr marL="457200" indent="0">
-              <a:buNone/>
-              <a:defRPr sz="2000">
+            <a:lvl2pPr marL="304815" indent="0">
+              <a:buNone/>
+              <a:defRPr sz="1333">
                 <a:solidFill>
                   <a:schemeClr val="tx1">
                     <a:tint val="75000"/>
@@ -913,9 +1267,9 @@
                 </a:solidFill>
               </a:defRPr>
             </a:lvl2pPr>
-            <a:lvl3pPr marL="914400" indent="0">
-              <a:buNone/>
-              <a:defRPr sz="1800">
+            <a:lvl3pPr marL="609630" indent="0">
+              <a:buNone/>
+              <a:defRPr sz="1200">
                 <a:solidFill>
                   <a:schemeClr val="tx1">
                     <a:tint val="75000"/>
@@ -923,9 +1277,9 @@
                 </a:solidFill>
               </a:defRPr>
             </a:lvl3pPr>
-            <a:lvl4pPr marL="1371600" indent="0">
-              <a:buNone/>
-              <a:defRPr sz="1600">
+            <a:lvl4pPr marL="914446" indent="0">
+              <a:buNone/>
+              <a:defRPr sz="1067">
                 <a:solidFill>
                   <a:schemeClr val="tx1">
                     <a:tint val="75000"/>
@@ -933,9 +1287,9 @@
                 </a:solidFill>
               </a:defRPr>
             </a:lvl4pPr>
-            <a:lvl5pPr marL="1828800" indent="0">
-              <a:buNone/>
-              <a:defRPr sz="1600">
+            <a:lvl5pPr marL="1219261" indent="0">
+              <a:buNone/>
+              <a:defRPr sz="1067">
                 <a:solidFill>
                   <a:schemeClr val="tx1">
                     <a:tint val="75000"/>
@@ -943,9 +1297,9 @@
                 </a:solidFill>
               </a:defRPr>
             </a:lvl5pPr>
-            <a:lvl6pPr marL="2286000" indent="0">
-              <a:buNone/>
-              <a:defRPr sz="1600">
+            <a:lvl6pPr marL="1524076" indent="0">
+              <a:buNone/>
+              <a:defRPr sz="1067">
                 <a:solidFill>
                   <a:schemeClr val="tx1">
                     <a:tint val="75000"/>
@@ -953,9 +1307,9 @@
                 </a:solidFill>
               </a:defRPr>
             </a:lvl6pPr>
-            <a:lvl7pPr marL="2743200" indent="0">
-              <a:buNone/>
-              <a:defRPr sz="1600">
+            <a:lvl7pPr marL="1828891" indent="0">
+              <a:buNone/>
+              <a:defRPr sz="1067">
                 <a:solidFill>
                   <a:schemeClr val="tx1">
                     <a:tint val="75000"/>
@@ -963,9 +1317,9 @@
                 </a:solidFill>
               </a:defRPr>
             </a:lvl7pPr>
-            <a:lvl8pPr marL="3200400" indent="0">
-              <a:buNone/>
-              <a:defRPr sz="1600">
+            <a:lvl8pPr marL="2133707" indent="0">
+              <a:buNone/>
+              <a:defRPr sz="1067">
                 <a:solidFill>
                   <a:schemeClr val="tx1">
                     <a:tint val="75000"/>
@@ -973,9 +1327,9 @@
                 </a:solidFill>
               </a:defRPr>
             </a:lvl8pPr>
-            <a:lvl9pPr marL="3657600" indent="0">
-              <a:buNone/>
-              <a:defRPr sz="1600">
+            <a:lvl9pPr marL="2438522" indent="0">
+              <a:buNone/>
+              <a:defRPr sz="1067">
                 <a:solidFill>
                   <a:schemeClr val="tx1">
                     <a:tint val="75000"/>
@@ -1010,7 +1364,7 @@
           <a:p>
             <a:fld id="{5C2F6762-7B27-4D78-B4B8-E61606A5A872}" type="datetimeFigureOut">
               <a:rPr lang="en-US" smtClean="0"/>
-              <a:t>6/4/2018</a:t>
+              <a:t>6/6/2018</a:t>
             </a:fld>
             <a:endParaRPr lang="en-US"/>
           </a:p>
@@ -1061,7 +1415,7 @@
     </p:spTree>
     <p:extLst>
       <p:ext uri="{BB962C8B-B14F-4D97-AF65-F5344CB8AC3E}">
-        <p14:creationId xmlns:p14="http://schemas.microsoft.com/office/powerpoint/2010/main" val="1254924204"/>
+        <p14:creationId xmlns:p14="http://schemas.microsoft.com/office/powerpoint/2010/main" val="2238886540"/>
       </p:ext>
     </p:extLst>
   </p:cSld>
@@ -1107,7 +1461,7 @@
               <a:rPr lang="en-US" smtClean="0"/>
               <a:t>Click to edit Master title style</a:t>
             </a:r>
-            <a:endParaRPr lang="en-US"/>
+            <a:endParaRPr lang="en-US" dirty="0"/>
           </a:p>
         </p:txBody>
       </p:sp>
@@ -1123,8 +1477,8 @@
         </p:nvSpPr>
         <p:spPr>
           <a:xfrm>
-            <a:off x="838200" y="1825625"/>
-            <a:ext cx="5181600" cy="4351338"/>
+            <a:off x="628650" y="1217083"/>
+            <a:ext cx="3886200" cy="2900892"/>
           </a:xfrm>
         </p:spPr>
         <p:txBody>
@@ -1164,7 +1518,7 @@
               <a:rPr lang="en-US" smtClean="0"/>
               <a:t>Fifth level</a:t>
             </a:r>
-            <a:endParaRPr lang="en-US"/>
+            <a:endParaRPr lang="en-US" dirty="0"/>
           </a:p>
         </p:txBody>
       </p:sp>
@@ -1180,8 +1534,8 @@
         </p:nvSpPr>
         <p:spPr>
           <a:xfrm>
-            <a:off x="6172200" y="1825625"/>
-            <a:ext cx="5181600" cy="4351338"/>
+            <a:off x="4629150" y="1217083"/>
+            <a:ext cx="3886200" cy="2900892"/>
           </a:xfrm>
         </p:spPr>
         <p:txBody>
@@ -1221,7 +1575,7 @@
               <a:rPr lang="en-US" smtClean="0"/>
               <a:t>Fifth level</a:t>
             </a:r>
-            <a:endParaRPr lang="en-US"/>
+            <a:endParaRPr lang="en-US" dirty="0"/>
           </a:p>
         </p:txBody>
       </p:sp>
@@ -1242,7 +1596,7 @@
           <a:p>
             <a:fld id="{5C2F6762-7B27-4D78-B4B8-E61606A5A872}" type="datetimeFigureOut">
               <a:rPr lang="en-US" smtClean="0"/>
-              <a:t>6/4/2018</a:t>
+              <a:t>6/6/2018</a:t>
             </a:fld>
             <a:endParaRPr lang="en-US"/>
           </a:p>
@@ -1293,7 +1647,7 @@
     </p:spTree>
     <p:extLst>
       <p:ext uri="{BB962C8B-B14F-4D97-AF65-F5344CB8AC3E}">
-        <p14:creationId xmlns:p14="http://schemas.microsoft.com/office/powerpoint/2010/main" val="728429303"/>
+        <p14:creationId xmlns:p14="http://schemas.microsoft.com/office/powerpoint/2010/main" val="3892844396"/>
       </p:ext>
     </p:extLst>
   </p:cSld>
@@ -1332,8 +1686,8 @@
         </p:nvSpPr>
         <p:spPr>
           <a:xfrm>
-            <a:off x="839788" y="365125"/>
-            <a:ext cx="10515600" cy="1325563"/>
+            <a:off x="629841" y="243417"/>
+            <a:ext cx="7886700" cy="883709"/>
           </a:xfrm>
         </p:spPr>
         <p:txBody>
@@ -1344,7 +1698,7 @@
               <a:rPr lang="en-US" smtClean="0"/>
               <a:t>Click to edit Master title style</a:t>
             </a:r>
-            <a:endParaRPr lang="en-US"/>
+            <a:endParaRPr lang="en-US" dirty="0"/>
           </a:p>
         </p:txBody>
       </p:sp>
@@ -1360,8 +1714,8 @@
         </p:nvSpPr>
         <p:spPr>
           <a:xfrm>
-            <a:off x="839788" y="1681163"/>
-            <a:ext cx="5157787" cy="823912"/>
+            <a:off x="629842" y="1120775"/>
+            <a:ext cx="3868340" cy="549275"/>
           </a:xfrm>
         </p:spPr>
         <p:txBody>
@@ -1369,39 +1723,39 @@
           <a:lstStyle>
             <a:lvl1pPr marL="0" indent="0">
               <a:buNone/>
-              <a:defRPr sz="2400" b="1"/>
+              <a:defRPr sz="1600" b="1"/>
             </a:lvl1pPr>
-            <a:lvl2pPr marL="457200" indent="0">
-              <a:buNone/>
-              <a:defRPr sz="2000" b="1"/>
+            <a:lvl2pPr marL="304815" indent="0">
+              <a:buNone/>
+              <a:defRPr sz="1333" b="1"/>
             </a:lvl2pPr>
-            <a:lvl3pPr marL="914400" indent="0">
-              <a:buNone/>
-              <a:defRPr sz="1800" b="1"/>
+            <a:lvl3pPr marL="609630" indent="0">
+              <a:buNone/>
+              <a:defRPr sz="1200" b="1"/>
             </a:lvl3pPr>
-            <a:lvl4pPr marL="1371600" indent="0">
-              <a:buNone/>
-              <a:defRPr sz="1600" b="1"/>
+            <a:lvl4pPr marL="914446" indent="0">
+              <a:buNone/>
+              <a:defRPr sz="1067" b="1"/>
             </a:lvl4pPr>
-            <a:lvl5pPr marL="1828800" indent="0">
-              <a:buNone/>
-              <a:defRPr sz="1600" b="1"/>
+            <a:lvl5pPr marL="1219261" indent="0">
+              <a:buNone/>
+              <a:defRPr sz="1067" b="1"/>
             </a:lvl5pPr>
-            <a:lvl6pPr marL="2286000" indent="0">
-              <a:buNone/>
-              <a:defRPr sz="1600" b="1"/>
+            <a:lvl6pPr marL="1524076" indent="0">
+              <a:buNone/>
+              <a:defRPr sz="1067" b="1"/>
             </a:lvl6pPr>
-            <a:lvl7pPr marL="2743200" indent="0">
-              <a:buNone/>
-              <a:defRPr sz="1600" b="1"/>
+            <a:lvl7pPr marL="1828891" indent="0">
+              <a:buNone/>
+              <a:defRPr sz="1067" b="1"/>
             </a:lvl7pPr>
-            <a:lvl8pPr marL="3200400" indent="0">
-              <a:buNone/>
-              <a:defRPr sz="1600" b="1"/>
+            <a:lvl8pPr marL="2133707" indent="0">
+              <a:buNone/>
+              <a:defRPr sz="1067" b="1"/>
             </a:lvl8pPr>
-            <a:lvl9pPr marL="3657600" indent="0">
-              <a:buNone/>
-              <a:defRPr sz="1600" b="1"/>
+            <a:lvl9pPr marL="2438522" indent="0">
+              <a:buNone/>
+              <a:defRPr sz="1067" b="1"/>
             </a:lvl9pPr>
           </a:lstStyle>
           <a:p>
@@ -1425,8 +1779,8 @@
         </p:nvSpPr>
         <p:spPr>
           <a:xfrm>
-            <a:off x="839788" y="2505075"/>
-            <a:ext cx="5157787" cy="3684588"/>
+            <a:off x="629842" y="1670050"/>
+            <a:ext cx="3868340" cy="2456392"/>
           </a:xfrm>
         </p:spPr>
         <p:txBody>
@@ -1466,7 +1820,7 @@
               <a:rPr lang="en-US" smtClean="0"/>
               <a:t>Fifth level</a:t>
             </a:r>
-            <a:endParaRPr lang="en-US"/>
+            <a:endParaRPr lang="en-US" dirty="0"/>
           </a:p>
         </p:txBody>
       </p:sp>
@@ -1482,8 +1836,8 @@
         </p:nvSpPr>
         <p:spPr>
           <a:xfrm>
-            <a:off x="6172200" y="1681163"/>
-            <a:ext cx="5183188" cy="823912"/>
+            <a:off x="4629150" y="1120775"/>
+            <a:ext cx="3887391" cy="549275"/>
           </a:xfrm>
         </p:spPr>
         <p:txBody>
@@ -1491,39 +1845,39 @@
           <a:lstStyle>
             <a:lvl1pPr marL="0" indent="0">
               <a:buNone/>
-              <a:defRPr sz="2400" b="1"/>
+              <a:defRPr sz="1600" b="1"/>
             </a:lvl1pPr>
-            <a:lvl2pPr marL="457200" indent="0">
-              <a:buNone/>
-              <a:defRPr sz="2000" b="1"/>
+            <a:lvl2pPr marL="304815" indent="0">
+              <a:buNone/>
+              <a:defRPr sz="1333" b="1"/>
             </a:lvl2pPr>
-            <a:lvl3pPr marL="914400" indent="0">
-              <a:buNone/>
-              <a:defRPr sz="1800" b="1"/>
+            <a:lvl3pPr marL="609630" indent="0">
+              <a:buNone/>
+              <a:defRPr sz="1200" b="1"/>
             </a:lvl3pPr>
-            <a:lvl4pPr marL="1371600" indent="0">
-              <a:buNone/>
-              <a:defRPr sz="1600" b="1"/>
+            <a:lvl4pPr marL="914446" indent="0">
+              <a:buNone/>
+              <a:defRPr sz="1067" b="1"/>
             </a:lvl4pPr>
-            <a:lvl5pPr marL="1828800" indent="0">
-              <a:buNone/>
-              <a:defRPr sz="1600" b="1"/>
+            <a:lvl5pPr marL="1219261" indent="0">
+              <a:buNone/>
+              <a:defRPr sz="1067" b="1"/>
             </a:lvl5pPr>
-            <a:lvl6pPr marL="2286000" indent="0">
-              <a:buNone/>
-              <a:defRPr sz="1600" b="1"/>
+            <a:lvl6pPr marL="1524076" indent="0">
+              <a:buNone/>
+              <a:defRPr sz="1067" b="1"/>
             </a:lvl6pPr>
-            <a:lvl7pPr marL="2743200" indent="0">
-              <a:buNone/>
-              <a:defRPr sz="1600" b="1"/>
+            <a:lvl7pPr marL="1828891" indent="0">
+              <a:buNone/>
+              <a:defRPr sz="1067" b="1"/>
             </a:lvl7pPr>
-            <a:lvl8pPr marL="3200400" indent="0">
-              <a:buNone/>
-              <a:defRPr sz="1600" b="1"/>
+            <a:lvl8pPr marL="2133707" indent="0">
+              <a:buNone/>
+              <a:defRPr sz="1067" b="1"/>
             </a:lvl8pPr>
-            <a:lvl9pPr marL="3657600" indent="0">
-              <a:buNone/>
-              <a:defRPr sz="1600" b="1"/>
+            <a:lvl9pPr marL="2438522" indent="0">
+              <a:buNone/>
+              <a:defRPr sz="1067" b="1"/>
             </a:lvl9pPr>
           </a:lstStyle>
           <a:p>
@@ -1547,8 +1901,8 @@
         </p:nvSpPr>
         <p:spPr>
           <a:xfrm>
-            <a:off x="6172200" y="2505075"/>
-            <a:ext cx="5183188" cy="3684588"/>
+            <a:off x="4629150" y="1670050"/>
+            <a:ext cx="3887391" cy="2456392"/>
           </a:xfrm>
         </p:spPr>
         <p:txBody>
@@ -1588,7 +1942,7 @@
               <a:rPr lang="en-US" smtClean="0"/>
               <a:t>Fifth level</a:t>
             </a:r>
-            <a:endParaRPr lang="en-US"/>
+            <a:endParaRPr lang="en-US" dirty="0"/>
           </a:p>
         </p:txBody>
       </p:sp>
@@ -1609,7 +1963,7 @@
           <a:p>
             <a:fld id="{5C2F6762-7B27-4D78-B4B8-E61606A5A872}" type="datetimeFigureOut">
               <a:rPr lang="en-US" smtClean="0"/>
-              <a:t>6/4/2018</a:t>
+              <a:t>6/6/2018</a:t>
             </a:fld>
             <a:endParaRPr lang="en-US"/>
           </a:p>
@@ -1660,7 +2014,7 @@
     </p:spTree>
     <p:extLst>
       <p:ext uri="{BB962C8B-B14F-4D97-AF65-F5344CB8AC3E}">
-        <p14:creationId xmlns:p14="http://schemas.microsoft.com/office/powerpoint/2010/main" val="3783523993"/>
+        <p14:creationId xmlns:p14="http://schemas.microsoft.com/office/powerpoint/2010/main" val="2973585544"/>
       </p:ext>
     </p:extLst>
   </p:cSld>
@@ -1706,7 +2060,7 @@
               <a:rPr lang="en-US" smtClean="0"/>
               <a:t>Click to edit Master title style</a:t>
             </a:r>
-            <a:endParaRPr lang="en-US"/>
+            <a:endParaRPr lang="en-US" dirty="0"/>
           </a:p>
         </p:txBody>
       </p:sp>
@@ -1727,7 +2081,7 @@
           <a:p>
             <a:fld id="{5C2F6762-7B27-4D78-B4B8-E61606A5A872}" type="datetimeFigureOut">
               <a:rPr lang="en-US" smtClean="0"/>
-              <a:t>6/4/2018</a:t>
+              <a:t>6/6/2018</a:t>
             </a:fld>
             <a:endParaRPr lang="en-US"/>
           </a:p>
@@ -1778,7 +2132,7 @@
     </p:spTree>
     <p:extLst>
       <p:ext uri="{BB962C8B-B14F-4D97-AF65-F5344CB8AC3E}">
-        <p14:creationId xmlns:p14="http://schemas.microsoft.com/office/powerpoint/2010/main" val="3170264012"/>
+        <p14:creationId xmlns:p14="http://schemas.microsoft.com/office/powerpoint/2010/main" val="1265735051"/>
       </p:ext>
     </p:extLst>
   </p:cSld>
@@ -1822,7 +2176,7 @@
           <a:p>
             <a:fld id="{5C2F6762-7B27-4D78-B4B8-E61606A5A872}" type="datetimeFigureOut">
               <a:rPr lang="en-US" smtClean="0"/>
-              <a:t>6/4/2018</a:t>
+              <a:t>6/6/2018</a:t>
             </a:fld>
             <a:endParaRPr lang="en-US"/>
           </a:p>
@@ -1873,7 +2227,7 @@
     </p:spTree>
     <p:extLst>
       <p:ext uri="{BB962C8B-B14F-4D97-AF65-F5344CB8AC3E}">
-        <p14:creationId xmlns:p14="http://schemas.microsoft.com/office/powerpoint/2010/main" val="3511937081"/>
+        <p14:creationId xmlns:p14="http://schemas.microsoft.com/office/powerpoint/2010/main" val="1683980566"/>
       </p:ext>
     </p:extLst>
   </p:cSld>
@@ -1912,15 +2266,15 @@
         </p:nvSpPr>
         <p:spPr>
           <a:xfrm>
-            <a:off x="839788" y="457200"/>
-            <a:ext cx="3932237" cy="1600200"/>
+            <a:off x="629841" y="304800"/>
+            <a:ext cx="2949178" cy="1066800"/>
           </a:xfrm>
         </p:spPr>
         <p:txBody>
           <a:bodyPr anchor="b"/>
           <a:lstStyle>
             <a:lvl1pPr>
-              <a:defRPr sz="3200"/>
+              <a:defRPr sz="2133"/>
             </a:lvl1pPr>
           </a:lstStyle>
           <a:p>
@@ -1928,7 +2282,7 @@
               <a:rPr lang="en-US" smtClean="0"/>
               <a:t>Click to edit Master title style</a:t>
             </a:r>
-            <a:endParaRPr lang="en-US"/>
+            <a:endParaRPr lang="en-US" dirty="0"/>
           </a:p>
         </p:txBody>
       </p:sp>
@@ -1944,39 +2298,39 @@
         </p:nvSpPr>
         <p:spPr>
           <a:xfrm>
-            <a:off x="5183188" y="987425"/>
-            <a:ext cx="6172200" cy="4873625"/>
+            <a:off x="3887391" y="658284"/>
+            <a:ext cx="4629150" cy="3249083"/>
           </a:xfrm>
         </p:spPr>
         <p:txBody>
           <a:bodyPr/>
           <a:lstStyle>
             <a:lvl1pPr>
-              <a:defRPr sz="3200"/>
+              <a:defRPr sz="2133"/>
             </a:lvl1pPr>
             <a:lvl2pPr>
-              <a:defRPr sz="2800"/>
+              <a:defRPr sz="1867"/>
             </a:lvl2pPr>
             <a:lvl3pPr>
-              <a:defRPr sz="2400"/>
+              <a:defRPr sz="1600"/>
             </a:lvl3pPr>
             <a:lvl4pPr>
-              <a:defRPr sz="2000"/>
+              <a:defRPr sz="1333"/>
             </a:lvl4pPr>
             <a:lvl5pPr>
-              <a:defRPr sz="2000"/>
+              <a:defRPr sz="1333"/>
             </a:lvl5pPr>
             <a:lvl6pPr>
-              <a:defRPr sz="2000"/>
+              <a:defRPr sz="1333"/>
             </a:lvl6pPr>
             <a:lvl7pPr>
-              <a:defRPr sz="2000"/>
+              <a:defRPr sz="1333"/>
             </a:lvl7pPr>
             <a:lvl8pPr>
-              <a:defRPr sz="2000"/>
+              <a:defRPr sz="1333"/>
             </a:lvl8pPr>
             <a:lvl9pPr>
-              <a:defRPr sz="2000"/>
+              <a:defRPr sz="1333"/>
             </a:lvl9pPr>
           </a:lstStyle>
           <a:p>
@@ -2013,7 +2367,7 @@
               <a:rPr lang="en-US" smtClean="0"/>
               <a:t>Fifth level</a:t>
             </a:r>
-            <a:endParaRPr lang="en-US"/>
+            <a:endParaRPr lang="en-US" dirty="0"/>
           </a:p>
         </p:txBody>
       </p:sp>
@@ -2029,8 +2383,8 @@
         </p:nvSpPr>
         <p:spPr>
           <a:xfrm>
-            <a:off x="839788" y="2057400"/>
-            <a:ext cx="3932237" cy="3811588"/>
+            <a:off x="629841" y="1371600"/>
+            <a:ext cx="2949178" cy="2541059"/>
           </a:xfrm>
         </p:spPr>
         <p:txBody>
@@ -2038,39 +2392,39 @@
           <a:lstStyle>
             <a:lvl1pPr marL="0" indent="0">
               <a:buNone/>
-              <a:defRPr sz="1600"/>
+              <a:defRPr sz="1067"/>
             </a:lvl1pPr>
-            <a:lvl2pPr marL="457200" indent="0">
-              <a:buNone/>
-              <a:defRPr sz="1400"/>
+            <a:lvl2pPr marL="304815" indent="0">
+              <a:buNone/>
+              <a:defRPr sz="933"/>
             </a:lvl2pPr>
-            <a:lvl3pPr marL="914400" indent="0">
-              <a:buNone/>
-              <a:defRPr sz="1200"/>
+            <a:lvl3pPr marL="609630" indent="0">
+              <a:buNone/>
+              <a:defRPr sz="800"/>
             </a:lvl3pPr>
-            <a:lvl4pPr marL="1371600" indent="0">
-              <a:buNone/>
-              <a:defRPr sz="1000"/>
+            <a:lvl4pPr marL="914446" indent="0">
+              <a:buNone/>
+              <a:defRPr sz="667"/>
             </a:lvl4pPr>
-            <a:lvl5pPr marL="1828800" indent="0">
-              <a:buNone/>
-              <a:defRPr sz="1000"/>
+            <a:lvl5pPr marL="1219261" indent="0">
+              <a:buNone/>
+              <a:defRPr sz="667"/>
             </a:lvl5pPr>
-            <a:lvl6pPr marL="2286000" indent="0">
-              <a:buNone/>
-              <a:defRPr sz="1000"/>
+            <a:lvl6pPr marL="1524076" indent="0">
+              <a:buNone/>
+              <a:defRPr sz="667"/>
             </a:lvl6pPr>
-            <a:lvl7pPr marL="2743200" indent="0">
-              <a:buNone/>
-              <a:defRPr sz="1000"/>
+            <a:lvl7pPr marL="1828891" indent="0">
+              <a:buNone/>
+              <a:defRPr sz="667"/>
             </a:lvl7pPr>
-            <a:lvl8pPr marL="3200400" indent="0">
-              <a:buNone/>
-              <a:defRPr sz="1000"/>
+            <a:lvl8pPr marL="2133707" indent="0">
+              <a:buNone/>
+              <a:defRPr sz="667"/>
             </a:lvl8pPr>
-            <a:lvl9pPr marL="3657600" indent="0">
-              <a:buNone/>
-              <a:defRPr sz="1000"/>
+            <a:lvl9pPr marL="2438522" indent="0">
+              <a:buNone/>
+              <a:defRPr sz="667"/>
             </a:lvl9pPr>
           </a:lstStyle>
           <a:p>
@@ -2099,7 +2453,7 @@
           <a:p>
             <a:fld id="{5C2F6762-7B27-4D78-B4B8-E61606A5A872}" type="datetimeFigureOut">
               <a:rPr lang="en-US" smtClean="0"/>
-              <a:t>6/4/2018</a:t>
+              <a:t>6/6/2018</a:t>
             </a:fld>
             <a:endParaRPr lang="en-US"/>
           </a:p>
@@ -2150,7 +2504,7 @@
     </p:spTree>
     <p:extLst>
       <p:ext uri="{BB962C8B-B14F-4D97-AF65-F5344CB8AC3E}">
-        <p14:creationId xmlns:p14="http://schemas.microsoft.com/office/powerpoint/2010/main" val="1172214449"/>
+        <p14:creationId xmlns:p14="http://schemas.microsoft.com/office/powerpoint/2010/main" val="2104443846"/>
       </p:ext>
     </p:extLst>
   </p:cSld>
@@ -2189,15 +2543,15 @@
         </p:nvSpPr>
         <p:spPr>
           <a:xfrm>
-            <a:off x="839788" y="457200"/>
-            <a:ext cx="3932237" cy="1600200"/>
+            <a:off x="629841" y="304800"/>
+            <a:ext cx="2949178" cy="1066800"/>
           </a:xfrm>
         </p:spPr>
         <p:txBody>
           <a:bodyPr anchor="b"/>
           <a:lstStyle>
             <a:lvl1pPr>
-              <a:defRPr sz="3200"/>
+              <a:defRPr sz="2133"/>
             </a:lvl1pPr>
           </a:lstStyle>
           <a:p>
@@ -2205,7 +2559,7 @@
               <a:rPr lang="en-US" smtClean="0"/>
               <a:t>Click to edit Master title style</a:t>
             </a:r>
-            <a:endParaRPr lang="en-US"/>
+            <a:endParaRPr lang="en-US" dirty="0"/>
           </a:p>
         </p:txBody>
       </p:sp>
@@ -2213,7 +2567,7 @@
         <p:nvSpPr>
           <p:cNvPr id="3" name="Picture Placeholder 2"/>
           <p:cNvSpPr>
-            <a:spLocks noGrp="1"/>
+            <a:spLocks noGrp="1" noChangeAspect="1"/>
           </p:cNvSpPr>
           <p:nvPr>
             <p:ph type="pic" idx="1"/>
@@ -2221,8 +2575,73 @@
         </p:nvSpPr>
         <p:spPr>
           <a:xfrm>
-            <a:off x="5183188" y="987425"/>
-            <a:ext cx="6172200" cy="4873625"/>
+            <a:off x="3887391" y="658284"/>
+            <a:ext cx="4629150" cy="3249083"/>
+          </a:xfrm>
+        </p:spPr>
+        <p:txBody>
+          <a:bodyPr anchor="t"/>
+          <a:lstStyle>
+            <a:lvl1pPr marL="0" indent="0">
+              <a:buNone/>
+              <a:defRPr sz="2133"/>
+            </a:lvl1pPr>
+            <a:lvl2pPr marL="304815" indent="0">
+              <a:buNone/>
+              <a:defRPr sz="1867"/>
+            </a:lvl2pPr>
+            <a:lvl3pPr marL="609630" indent="0">
+              <a:buNone/>
+              <a:defRPr sz="1600"/>
+            </a:lvl3pPr>
+            <a:lvl4pPr marL="914446" indent="0">
+              <a:buNone/>
+              <a:defRPr sz="1333"/>
+            </a:lvl4pPr>
+            <a:lvl5pPr marL="1219261" indent="0">
+              <a:buNone/>
+              <a:defRPr sz="1333"/>
+            </a:lvl5pPr>
+            <a:lvl6pPr marL="1524076" indent="0">
+              <a:buNone/>
+              <a:defRPr sz="1333"/>
+            </a:lvl6pPr>
+            <a:lvl7pPr marL="1828891" indent="0">
+              <a:buNone/>
+              <a:defRPr sz="1333"/>
+            </a:lvl7pPr>
+            <a:lvl8pPr marL="2133707" indent="0">
+              <a:buNone/>
+              <a:defRPr sz="1333"/>
+            </a:lvl8pPr>
+            <a:lvl9pPr marL="2438522" indent="0">
+              <a:buNone/>
+              <a:defRPr sz="1333"/>
+            </a:lvl9pPr>
+          </a:lstStyle>
+          <a:p>
+            <a:r>
+              <a:rPr lang="en-US" smtClean="0"/>
+              <a:t>Click icon to add picture</a:t>
+            </a:r>
+            <a:endParaRPr lang="en-US" dirty="0"/>
+          </a:p>
+        </p:txBody>
+      </p:sp>
+      <p:sp>
+        <p:nvSpPr>
+          <p:cNvPr id="4" name="Text Placeholder 3"/>
+          <p:cNvSpPr>
+            <a:spLocks noGrp="1"/>
+          </p:cNvSpPr>
+          <p:nvPr>
+            <p:ph type="body" sz="half" idx="2"/>
+          </p:nvPr>
+        </p:nvSpPr>
+        <p:spPr>
+          <a:xfrm>
+            <a:off x="629841" y="1371600"/>
+            <a:ext cx="2949178" cy="2541059"/>
           </a:xfrm>
         </p:spPr>
         <p:txBody>
@@ -2230,129 +2649,68 @@
           <a:lstStyle>
             <a:lvl1pPr marL="0" indent="0">
               <a:buNone/>
-              <a:defRPr sz="3200"/>
+              <a:defRPr sz="1067"/>
             </a:lvl1pPr>
-            <a:lvl2pPr marL="457200" indent="0">
-              <a:buNone/>
-              <a:defRPr sz="2800"/>
+            <a:lvl2pPr marL="304815" indent="0">
+              <a:buNone/>
+              <a:defRPr sz="933"/>
             </a:lvl2pPr>
-            <a:lvl3pPr marL="914400" indent="0">
-              <a:buNone/>
-              <a:defRPr sz="2400"/>
+            <a:lvl3pPr marL="609630" indent="0">
+              <a:buNone/>
+              <a:defRPr sz="800"/>
             </a:lvl3pPr>
-            <a:lvl4pPr marL="1371600" indent="0">
-              <a:buNone/>
-              <a:defRPr sz="2000"/>
+            <a:lvl4pPr marL="914446" indent="0">
+              <a:buNone/>
+              <a:defRPr sz="667"/>
             </a:lvl4pPr>
-            <a:lvl5pPr marL="1828800" indent="0">
-              <a:buNone/>
-              <a:defRPr sz="2000"/>
+            <a:lvl5pPr marL="1219261" indent="0">
+              <a:buNone/>
+              <a:defRPr sz="667"/>
             </a:lvl5pPr>
-            <a:lvl6pPr marL="2286000" indent="0">
-              <a:buNone/>
-              <a:defRPr sz="2000"/>
+            <a:lvl6pPr marL="1524076" indent="0">
+              <a:buNone/>
+              <a:defRPr sz="667"/>
             </a:lvl6pPr>
-            <a:lvl7pPr marL="2743200" indent="0">
-              <a:buNone/>
-              <a:defRPr sz="2000"/>
+            <a:lvl7pPr marL="1828891" indent="0">
+              <a:buNone/>
+              <a:defRPr sz="667"/>
             </a:lvl7pPr>
-            <a:lvl8pPr marL="3200400" indent="0">
-              <a:buNone/>
-              <a:defRPr sz="2000"/>
+            <a:lvl8pPr marL="2133707" indent="0">
+              <a:buNone/>
+              <a:defRPr sz="667"/>
             </a:lvl8pPr>
-            <a:lvl9pPr marL="3657600" indent="0">
-              <a:buNone/>
-              <a:defRPr sz="2000"/>
+            <a:lvl9pPr marL="2438522" indent="0">
+              <a:buNone/>
+              <a:defRPr sz="667"/>
             </a:lvl9pPr>
           </a:lstStyle>
           <a:p>
-            <a:endParaRPr lang="en-US"/>
-          </a:p>
-        </p:txBody>
-      </p:sp>
-      <p:sp>
-        <p:nvSpPr>
-          <p:cNvPr id="4" name="Text Placeholder 3"/>
-          <p:cNvSpPr>
-            <a:spLocks noGrp="1"/>
-          </p:cNvSpPr>
-          <p:nvPr>
-            <p:ph type="body" sz="half" idx="2"/>
-          </p:nvPr>
-        </p:nvSpPr>
-        <p:spPr>
-          <a:xfrm>
-            <a:off x="839788" y="2057400"/>
-            <a:ext cx="3932237" cy="3811588"/>
-          </a:xfrm>
-        </p:spPr>
+            <a:pPr lvl="0"/>
+            <a:r>
+              <a:rPr lang="en-US" smtClean="0"/>
+              <a:t>Click to edit Master text styles</a:t>
+            </a:r>
+          </a:p>
+        </p:txBody>
+      </p:sp>
+      <p:sp>
+        <p:nvSpPr>
+          <p:cNvPr id="5" name="Date Placeholder 4"/>
+          <p:cNvSpPr>
+            <a:spLocks noGrp="1"/>
+          </p:cNvSpPr>
+          <p:nvPr>
+            <p:ph type="dt" sz="half" idx="10"/>
+          </p:nvPr>
+        </p:nvSpPr>
+        <p:spPr/>
         <p:txBody>
           <a:bodyPr/>
-          <a:lstStyle>
-            <a:lvl1pPr marL="0" indent="0">
-              <a:buNone/>
-              <a:defRPr sz="1600"/>
-            </a:lvl1pPr>
-            <a:lvl2pPr marL="457200" indent="0">
-              <a:buNone/>
-              <a:defRPr sz="1400"/>
-            </a:lvl2pPr>
-            <a:lvl3pPr marL="914400" indent="0">
-              <a:buNone/>
-              <a:defRPr sz="1200"/>
-            </a:lvl3pPr>
-            <a:lvl4pPr marL="1371600" indent="0">
-              <a:buNone/>
-              <a:defRPr sz="1000"/>
-            </a:lvl4pPr>
-            <a:lvl5pPr marL="1828800" indent="0">
-              <a:buNone/>
-              <a:defRPr sz="1000"/>
-            </a:lvl5pPr>
-            <a:lvl6pPr marL="2286000" indent="0">
-              <a:buNone/>
-              <a:defRPr sz="1000"/>
-            </a:lvl6pPr>
-            <a:lvl7pPr marL="2743200" indent="0">
-              <a:buNone/>
-              <a:defRPr sz="1000"/>
-            </a:lvl7pPr>
-            <a:lvl8pPr marL="3200400" indent="0">
-              <a:buNone/>
-              <a:defRPr sz="1000"/>
-            </a:lvl8pPr>
-            <a:lvl9pPr marL="3657600" indent="0">
-              <a:buNone/>
-              <a:defRPr sz="1000"/>
-            </a:lvl9pPr>
-          </a:lstStyle>
-          <a:p>
-            <a:pPr lvl="0"/>
-            <a:r>
-              <a:rPr lang="en-US" smtClean="0"/>
-              <a:t>Click to edit Master text styles</a:t>
-            </a:r>
-          </a:p>
-        </p:txBody>
-      </p:sp>
-      <p:sp>
-        <p:nvSpPr>
-          <p:cNvPr id="5" name="Date Placeholder 4"/>
-          <p:cNvSpPr>
-            <a:spLocks noGrp="1"/>
-          </p:cNvSpPr>
-          <p:nvPr>
-            <p:ph type="dt" sz="half" idx="10"/>
-          </p:nvPr>
-        </p:nvSpPr>
-        <p:spPr/>
-        <p:txBody>
-          <a:bodyPr/>
           <a:lstStyle/>
           <a:p>
             <a:fld id="{5C2F6762-7B27-4D78-B4B8-E61606A5A872}" type="datetimeFigureOut">
               <a:rPr lang="en-US" smtClean="0"/>
-              <a:t>6/4/2018</a:t>
+              <a:t>6/6/2018</a:t>
             </a:fld>
             <a:endParaRPr lang="en-US"/>
           </a:p>
@@ -2403,7 +2761,7 @@
     </p:spTree>
     <p:extLst>
       <p:ext uri="{BB962C8B-B14F-4D97-AF65-F5344CB8AC3E}">
-        <p14:creationId xmlns:p14="http://schemas.microsoft.com/office/powerpoint/2010/main" val="2341039225"/>
+        <p14:creationId xmlns:p14="http://schemas.microsoft.com/office/powerpoint/2010/main" val="2573695007"/>
       </p:ext>
     </p:extLst>
   </p:cSld>
@@ -2447,8 +2805,8 @@
         </p:nvSpPr>
         <p:spPr>
           <a:xfrm>
-            <a:off x="838200" y="365125"/>
-            <a:ext cx="10515600" cy="1325563"/>
+            <a:off x="628650" y="243417"/>
+            <a:ext cx="7886700" cy="883709"/>
           </a:xfrm>
           <a:prstGeom prst="rect">
             <a:avLst/>
@@ -2464,7 +2822,7 @@
               <a:rPr lang="en-US" smtClean="0"/>
               <a:t>Click to edit Master title style</a:t>
             </a:r>
-            <a:endParaRPr lang="en-US"/>
+            <a:endParaRPr lang="en-US" dirty="0"/>
           </a:p>
         </p:txBody>
       </p:sp>
@@ -2480,8 +2838,8 @@
         </p:nvSpPr>
         <p:spPr>
           <a:xfrm>
-            <a:off x="838200" y="1825625"/>
-            <a:ext cx="10515600" cy="4351338"/>
+            <a:off x="628650" y="1217083"/>
+            <a:ext cx="7886700" cy="2900892"/>
           </a:xfrm>
           <a:prstGeom prst="rect">
             <a:avLst/>
@@ -2526,7 +2884,7 @@
               <a:rPr lang="en-US" smtClean="0"/>
               <a:t>Fifth level</a:t>
             </a:r>
-            <a:endParaRPr lang="en-US"/>
+            <a:endParaRPr lang="en-US" dirty="0"/>
           </a:p>
         </p:txBody>
       </p:sp>
@@ -2542,8 +2900,8 @@
         </p:nvSpPr>
         <p:spPr>
           <a:xfrm>
-            <a:off x="838200" y="6356350"/>
-            <a:ext cx="2743200" cy="365125"/>
+            <a:off x="628650" y="4237567"/>
+            <a:ext cx="2057400" cy="243417"/>
           </a:xfrm>
           <a:prstGeom prst="rect">
             <a:avLst/>
@@ -2553,7 +2911,7 @@
           <a:bodyPr vert="horz" lIns="91440" tIns="45720" rIns="91440" bIns="45720" rtlCol="0" anchor="ctr"/>
           <a:lstStyle>
             <a:lvl1pPr algn="l">
-              <a:defRPr sz="1200">
+              <a:defRPr sz="800">
                 <a:solidFill>
                   <a:schemeClr val="tx1">
                     <a:tint val="75000"/>
@@ -2565,7 +2923,7 @@
           <a:p>
             <a:fld id="{5C2F6762-7B27-4D78-B4B8-E61606A5A872}" type="datetimeFigureOut">
               <a:rPr lang="en-US" smtClean="0"/>
-              <a:t>6/4/2018</a:t>
+              <a:t>6/6/2018</a:t>
             </a:fld>
             <a:endParaRPr lang="en-US"/>
           </a:p>
@@ -2583,8 +2941,8 @@
         </p:nvSpPr>
         <p:spPr>
           <a:xfrm>
-            <a:off x="4038600" y="6356350"/>
-            <a:ext cx="4114800" cy="365125"/>
+            <a:off x="3028950" y="4237567"/>
+            <a:ext cx="3086100" cy="243417"/>
           </a:xfrm>
           <a:prstGeom prst="rect">
             <a:avLst/>
@@ -2594,7 +2952,7 @@
           <a:bodyPr vert="horz" lIns="91440" tIns="45720" rIns="91440" bIns="45720" rtlCol="0" anchor="ctr"/>
           <a:lstStyle>
             <a:lvl1pPr algn="ctr">
-              <a:defRPr sz="1200">
+              <a:defRPr sz="800">
                 <a:solidFill>
                   <a:schemeClr val="tx1">
                     <a:tint val="75000"/>
@@ -2620,8 +2978,8 @@
         </p:nvSpPr>
         <p:spPr>
           <a:xfrm>
-            <a:off x="8610600" y="6356350"/>
-            <a:ext cx="2743200" cy="365125"/>
+            <a:off x="6457950" y="4237567"/>
+            <a:ext cx="2057400" cy="243417"/>
           </a:xfrm>
           <a:prstGeom prst="rect">
             <a:avLst/>
@@ -2631,7 +2989,7 @@
           <a:bodyPr vert="horz" lIns="91440" tIns="45720" rIns="91440" bIns="45720" rtlCol="0" anchor="ctr"/>
           <a:lstStyle>
             <a:lvl1pPr algn="r">
-              <a:defRPr sz="1200">
+              <a:defRPr sz="800">
                 <a:solidFill>
                   <a:schemeClr val="tx1">
                     <a:tint val="75000"/>
@@ -2652,27 +3010,27 @@
     </p:spTree>
     <p:extLst>
       <p:ext uri="{BB962C8B-B14F-4D97-AF65-F5344CB8AC3E}">
-        <p14:creationId xmlns:p14="http://schemas.microsoft.com/office/powerpoint/2010/main" val="3715799830"/>
+        <p14:creationId xmlns:p14="http://schemas.microsoft.com/office/powerpoint/2010/main" val="2228409888"/>
       </p:ext>
     </p:extLst>
   </p:cSld>
   <p:clrMap bg1="lt1" tx1="dk1" bg2="lt2" tx2="dk2" accent1="accent1" accent2="accent2" accent3="accent3" accent4="accent4" accent5="accent5" accent6="accent6" hlink="hlink" folHlink="folHlink"/>
   <p:sldLayoutIdLst>
-    <p:sldLayoutId id="2147483649" r:id="rId1"/>
-    <p:sldLayoutId id="2147483650" r:id="rId2"/>
-    <p:sldLayoutId id="2147483651" r:id="rId3"/>
-    <p:sldLayoutId id="2147483652" r:id="rId4"/>
-    <p:sldLayoutId id="2147483653" r:id="rId5"/>
-    <p:sldLayoutId id="2147483654" r:id="rId6"/>
-    <p:sldLayoutId id="2147483655" r:id="rId7"/>
-    <p:sldLayoutId id="2147483656" r:id="rId8"/>
-    <p:sldLayoutId id="2147483657" r:id="rId9"/>
-    <p:sldLayoutId id="2147483658" r:id="rId10"/>
-    <p:sldLayoutId id="2147483659" r:id="rId11"/>
+    <p:sldLayoutId id="2147483673" r:id="rId1"/>
+    <p:sldLayoutId id="2147483674" r:id="rId2"/>
+    <p:sldLayoutId id="2147483675" r:id="rId3"/>
+    <p:sldLayoutId id="2147483676" r:id="rId4"/>
+    <p:sldLayoutId id="2147483677" r:id="rId5"/>
+    <p:sldLayoutId id="2147483678" r:id="rId6"/>
+    <p:sldLayoutId id="2147483679" r:id="rId7"/>
+    <p:sldLayoutId id="2147483680" r:id="rId8"/>
+    <p:sldLayoutId id="2147483681" r:id="rId9"/>
+    <p:sldLayoutId id="2147483682" r:id="rId10"/>
+    <p:sldLayoutId id="2147483683" r:id="rId11"/>
   </p:sldLayoutIdLst>
   <p:txStyles>
     <p:titleStyle>
-      <a:lvl1pPr algn="l" defTabSz="914400" rtl="0" eaLnBrk="1" latinLnBrk="0" hangingPunct="1">
+      <a:lvl1pPr algn="l" defTabSz="609630" rtl="0" eaLnBrk="1" latinLnBrk="0" hangingPunct="1">
         <a:lnSpc>
           <a:spcPct val="90000"/>
         </a:lnSpc>
@@ -2680,7 +3038,7 @@
           <a:spcPct val="0"/>
         </a:spcBef>
         <a:buNone/>
-        <a:defRPr sz="4400" kern="1200">
+        <a:defRPr sz="2933" kern="1200">
           <a:solidFill>
             <a:schemeClr val="tx1"/>
           </a:solidFill>
@@ -2691,16 +3049,16 @@
       </a:lvl1pPr>
     </p:titleStyle>
     <p:bodyStyle>
-      <a:lvl1pPr marL="228600" indent="-228600" algn="l" defTabSz="914400" rtl="0" eaLnBrk="1" latinLnBrk="0" hangingPunct="1">
+      <a:lvl1pPr marL="152408" indent="-152408" algn="l" defTabSz="609630" rtl="0" eaLnBrk="1" latinLnBrk="0" hangingPunct="1">
         <a:lnSpc>
           <a:spcPct val="90000"/>
         </a:lnSpc>
         <a:spcBef>
-          <a:spcPts val="1000"/>
+          <a:spcPts val="667"/>
         </a:spcBef>
         <a:buFont typeface="Arial" panose="020B0604020202020204" pitchFamily="34" charset="0"/>
         <a:buChar char="•"/>
-        <a:defRPr sz="2800" kern="1200">
+        <a:defRPr sz="1867" kern="1200">
           <a:solidFill>
             <a:schemeClr val="tx1"/>
           </a:solidFill>
@@ -2709,16 +3067,16 @@
           <a:cs typeface="+mn-cs"/>
         </a:defRPr>
       </a:lvl1pPr>
-      <a:lvl2pPr marL="685800" indent="-228600" algn="l" defTabSz="914400" rtl="0" eaLnBrk="1" latinLnBrk="0" hangingPunct="1">
+      <a:lvl2pPr marL="457223" indent="-152408" algn="l" defTabSz="609630" rtl="0" eaLnBrk="1" latinLnBrk="0" hangingPunct="1">
         <a:lnSpc>
           <a:spcPct val="90000"/>
         </a:lnSpc>
         <a:spcBef>
-          <a:spcPts val="500"/>
+          <a:spcPts val="333"/>
         </a:spcBef>
         <a:buFont typeface="Arial" panose="020B0604020202020204" pitchFamily="34" charset="0"/>
         <a:buChar char="•"/>
-        <a:defRPr sz="2400" kern="1200">
+        <a:defRPr sz="1600" kern="1200">
           <a:solidFill>
             <a:schemeClr val="tx1"/>
           </a:solidFill>
@@ -2727,16 +3085,16 @@
           <a:cs typeface="+mn-cs"/>
         </a:defRPr>
       </a:lvl2pPr>
-      <a:lvl3pPr marL="1143000" indent="-228600" algn="l" defTabSz="914400" rtl="0" eaLnBrk="1" latinLnBrk="0" hangingPunct="1">
+      <a:lvl3pPr marL="762038" indent="-152408" algn="l" defTabSz="609630" rtl="0" eaLnBrk="1" latinLnBrk="0" hangingPunct="1">
         <a:lnSpc>
           <a:spcPct val="90000"/>
         </a:lnSpc>
         <a:spcBef>
-          <a:spcPts val="500"/>
+          <a:spcPts val="333"/>
         </a:spcBef>
         <a:buFont typeface="Arial" panose="020B0604020202020204" pitchFamily="34" charset="0"/>
         <a:buChar char="•"/>
-        <a:defRPr sz="2000" kern="1200">
+        <a:defRPr sz="1333" kern="1200">
           <a:solidFill>
             <a:schemeClr val="tx1"/>
           </a:solidFill>
@@ -2745,16 +3103,16 @@
           <a:cs typeface="+mn-cs"/>
         </a:defRPr>
       </a:lvl3pPr>
-      <a:lvl4pPr marL="1600200" indent="-228600" algn="l" defTabSz="914400" rtl="0" eaLnBrk="1" latinLnBrk="0" hangingPunct="1">
+      <a:lvl4pPr marL="1066853" indent="-152408" algn="l" defTabSz="609630" rtl="0" eaLnBrk="1" latinLnBrk="0" hangingPunct="1">
         <a:lnSpc>
           <a:spcPct val="90000"/>
         </a:lnSpc>
         <a:spcBef>
-          <a:spcPts val="500"/>
+          <a:spcPts val="333"/>
         </a:spcBef>
         <a:buFont typeface="Arial" panose="020B0604020202020204" pitchFamily="34" charset="0"/>
         <a:buChar char="•"/>
-        <a:defRPr sz="1800" kern="1200">
+        <a:defRPr sz="1200" kern="1200">
           <a:solidFill>
             <a:schemeClr val="tx1"/>
           </a:solidFill>
@@ -2763,16 +3121,16 @@
           <a:cs typeface="+mn-cs"/>
         </a:defRPr>
       </a:lvl4pPr>
-      <a:lvl5pPr marL="2057400" indent="-228600" algn="l" defTabSz="914400" rtl="0" eaLnBrk="1" latinLnBrk="0" hangingPunct="1">
+      <a:lvl5pPr marL="1371669" indent="-152408" algn="l" defTabSz="609630" rtl="0" eaLnBrk="1" latinLnBrk="0" hangingPunct="1">
         <a:lnSpc>
           <a:spcPct val="90000"/>
         </a:lnSpc>
         <a:spcBef>
-          <a:spcPts val="500"/>
+          <a:spcPts val="333"/>
         </a:spcBef>
         <a:buFont typeface="Arial" panose="020B0604020202020204" pitchFamily="34" charset="0"/>
         <a:buChar char="•"/>
-        <a:defRPr sz="1800" kern="1200">
+        <a:defRPr sz="1200" kern="1200">
           <a:solidFill>
             <a:schemeClr val="tx1"/>
           </a:solidFill>
@@ -2781,16 +3139,16 @@
           <a:cs typeface="+mn-cs"/>
         </a:defRPr>
       </a:lvl5pPr>
-      <a:lvl6pPr marL="2514600" indent="-228600" algn="l" defTabSz="914400" rtl="0" eaLnBrk="1" latinLnBrk="0" hangingPunct="1">
+      <a:lvl6pPr marL="1676484" indent="-152408" algn="l" defTabSz="609630" rtl="0" eaLnBrk="1" latinLnBrk="0" hangingPunct="1">
         <a:lnSpc>
           <a:spcPct val="90000"/>
         </a:lnSpc>
         <a:spcBef>
-          <a:spcPts val="500"/>
+          <a:spcPts val="333"/>
         </a:spcBef>
         <a:buFont typeface="Arial" panose="020B0604020202020204" pitchFamily="34" charset="0"/>
         <a:buChar char="•"/>
-        <a:defRPr sz="1800" kern="1200">
+        <a:defRPr sz="1200" kern="1200">
           <a:solidFill>
             <a:schemeClr val="tx1"/>
           </a:solidFill>
@@ -2799,16 +3157,16 @@
           <a:cs typeface="+mn-cs"/>
         </a:defRPr>
       </a:lvl6pPr>
-      <a:lvl7pPr marL="2971800" indent="-228600" algn="l" defTabSz="914400" rtl="0" eaLnBrk="1" latinLnBrk="0" hangingPunct="1">
+      <a:lvl7pPr marL="1981299" indent="-152408" algn="l" defTabSz="609630" rtl="0" eaLnBrk="1" latinLnBrk="0" hangingPunct="1">
         <a:lnSpc>
           <a:spcPct val="90000"/>
         </a:lnSpc>
         <a:spcBef>
-          <a:spcPts val="500"/>
+          <a:spcPts val="333"/>
         </a:spcBef>
         <a:buFont typeface="Arial" panose="020B0604020202020204" pitchFamily="34" charset="0"/>
         <a:buChar char="•"/>
-        <a:defRPr sz="1800" kern="1200">
+        <a:defRPr sz="1200" kern="1200">
           <a:solidFill>
             <a:schemeClr val="tx1"/>
           </a:solidFill>
@@ -2817,16 +3175,16 @@
           <a:cs typeface="+mn-cs"/>
         </a:defRPr>
       </a:lvl7pPr>
-      <a:lvl8pPr marL="3429000" indent="-228600" algn="l" defTabSz="914400" rtl="0" eaLnBrk="1" latinLnBrk="0" hangingPunct="1">
+      <a:lvl8pPr marL="2286114" indent="-152408" algn="l" defTabSz="609630" rtl="0" eaLnBrk="1" latinLnBrk="0" hangingPunct="1">
         <a:lnSpc>
           <a:spcPct val="90000"/>
         </a:lnSpc>
         <a:spcBef>
-          <a:spcPts val="500"/>
+          <a:spcPts val="333"/>
         </a:spcBef>
         <a:buFont typeface="Arial" panose="020B0604020202020204" pitchFamily="34" charset="0"/>
         <a:buChar char="•"/>
-        <a:defRPr sz="1800" kern="1200">
+        <a:defRPr sz="1200" kern="1200">
           <a:solidFill>
             <a:schemeClr val="tx1"/>
           </a:solidFill>
@@ -2835,16 +3193,16 @@
           <a:cs typeface="+mn-cs"/>
         </a:defRPr>
       </a:lvl8pPr>
-      <a:lvl9pPr marL="3886200" indent="-228600" algn="l" defTabSz="914400" rtl="0" eaLnBrk="1" latinLnBrk="0" hangingPunct="1">
+      <a:lvl9pPr marL="2590930" indent="-152408" algn="l" defTabSz="609630" rtl="0" eaLnBrk="1" latinLnBrk="0" hangingPunct="1">
         <a:lnSpc>
           <a:spcPct val="90000"/>
         </a:lnSpc>
         <a:spcBef>
-          <a:spcPts val="500"/>
+          <a:spcPts val="333"/>
         </a:spcBef>
         <a:buFont typeface="Arial" panose="020B0604020202020204" pitchFamily="34" charset="0"/>
         <a:buChar char="•"/>
-        <a:defRPr sz="1800" kern="1200">
+        <a:defRPr sz="1200" kern="1200">
           <a:solidFill>
             <a:schemeClr val="tx1"/>
           </a:solidFill>
@@ -2858,8 +3216,8 @@
       <a:defPPr>
         <a:defRPr lang="en-US"/>
       </a:defPPr>
-      <a:lvl1pPr marL="0" algn="l" defTabSz="914400" rtl="0" eaLnBrk="1" latinLnBrk="0" hangingPunct="1">
-        <a:defRPr sz="1800" kern="1200">
+      <a:lvl1pPr marL="0" algn="l" defTabSz="609630" rtl="0" eaLnBrk="1" latinLnBrk="0" hangingPunct="1">
+        <a:defRPr sz="1200" kern="1200">
           <a:solidFill>
             <a:schemeClr val="tx1"/>
           </a:solidFill>
@@ -2868,8 +3226,8 @@
           <a:cs typeface="+mn-cs"/>
         </a:defRPr>
       </a:lvl1pPr>
-      <a:lvl2pPr marL="457200" algn="l" defTabSz="914400" rtl="0" eaLnBrk="1" latinLnBrk="0" hangingPunct="1">
-        <a:defRPr sz="1800" kern="1200">
+      <a:lvl2pPr marL="304815" algn="l" defTabSz="609630" rtl="0" eaLnBrk="1" latinLnBrk="0" hangingPunct="1">
+        <a:defRPr sz="1200" kern="1200">
           <a:solidFill>
             <a:schemeClr val="tx1"/>
           </a:solidFill>
@@ -2878,8 +3236,8 @@
           <a:cs typeface="+mn-cs"/>
         </a:defRPr>
       </a:lvl2pPr>
-      <a:lvl3pPr marL="914400" algn="l" defTabSz="914400" rtl="0" eaLnBrk="1" latinLnBrk="0" hangingPunct="1">
-        <a:defRPr sz="1800" kern="1200">
+      <a:lvl3pPr marL="609630" algn="l" defTabSz="609630" rtl="0" eaLnBrk="1" latinLnBrk="0" hangingPunct="1">
+        <a:defRPr sz="1200" kern="1200">
           <a:solidFill>
             <a:schemeClr val="tx1"/>
           </a:solidFill>
@@ -2888,8 +3246,8 @@
           <a:cs typeface="+mn-cs"/>
         </a:defRPr>
       </a:lvl3pPr>
-      <a:lvl4pPr marL="1371600" algn="l" defTabSz="914400" rtl="0" eaLnBrk="1" latinLnBrk="0" hangingPunct="1">
-        <a:defRPr sz="1800" kern="1200">
+      <a:lvl4pPr marL="914446" algn="l" defTabSz="609630" rtl="0" eaLnBrk="1" latinLnBrk="0" hangingPunct="1">
+        <a:defRPr sz="1200" kern="1200">
           <a:solidFill>
             <a:schemeClr val="tx1"/>
           </a:solidFill>
@@ -2898,8 +3256,8 @@
           <a:cs typeface="+mn-cs"/>
         </a:defRPr>
       </a:lvl4pPr>
-      <a:lvl5pPr marL="1828800" algn="l" defTabSz="914400" rtl="0" eaLnBrk="1" latinLnBrk="0" hangingPunct="1">
-        <a:defRPr sz="1800" kern="1200">
+      <a:lvl5pPr marL="1219261" algn="l" defTabSz="609630" rtl="0" eaLnBrk="1" latinLnBrk="0" hangingPunct="1">
+        <a:defRPr sz="1200" kern="1200">
           <a:solidFill>
             <a:schemeClr val="tx1"/>
           </a:solidFill>
@@ -2908,8 +3266,8 @@
           <a:cs typeface="+mn-cs"/>
         </a:defRPr>
       </a:lvl5pPr>
-      <a:lvl6pPr marL="2286000" algn="l" defTabSz="914400" rtl="0" eaLnBrk="1" latinLnBrk="0" hangingPunct="1">
-        <a:defRPr sz="1800" kern="1200">
+      <a:lvl6pPr marL="1524076" algn="l" defTabSz="609630" rtl="0" eaLnBrk="1" latinLnBrk="0" hangingPunct="1">
+        <a:defRPr sz="1200" kern="1200">
           <a:solidFill>
             <a:schemeClr val="tx1"/>
           </a:solidFill>
@@ -2918,8 +3276,8 @@
           <a:cs typeface="+mn-cs"/>
         </a:defRPr>
       </a:lvl6pPr>
-      <a:lvl7pPr marL="2743200" algn="l" defTabSz="914400" rtl="0" eaLnBrk="1" latinLnBrk="0" hangingPunct="1">
-        <a:defRPr sz="1800" kern="1200">
+      <a:lvl7pPr marL="1828891" algn="l" defTabSz="609630" rtl="0" eaLnBrk="1" latinLnBrk="0" hangingPunct="1">
+        <a:defRPr sz="1200" kern="1200">
           <a:solidFill>
             <a:schemeClr val="tx1"/>
           </a:solidFill>
@@ -2928,8 +3286,8 @@
           <a:cs typeface="+mn-cs"/>
         </a:defRPr>
       </a:lvl7pPr>
-      <a:lvl8pPr marL="3200400" algn="l" defTabSz="914400" rtl="0" eaLnBrk="1" latinLnBrk="0" hangingPunct="1">
-        <a:defRPr sz="1800" kern="1200">
+      <a:lvl8pPr marL="2133707" algn="l" defTabSz="609630" rtl="0" eaLnBrk="1" latinLnBrk="0" hangingPunct="1">
+        <a:defRPr sz="1200" kern="1200">
           <a:solidFill>
             <a:schemeClr val="tx1"/>
           </a:solidFill>
@@ -2938,8 +3296,8 @@
           <a:cs typeface="+mn-cs"/>
         </a:defRPr>
       </a:lvl8pPr>
-      <a:lvl9pPr marL="3657600" algn="l" defTabSz="914400" rtl="0" eaLnBrk="1" latinLnBrk="0" hangingPunct="1">
-        <a:defRPr sz="1800" kern="1200">
+      <a:lvl9pPr marL="2438522" algn="l" defTabSz="609630" rtl="0" eaLnBrk="1" latinLnBrk="0" hangingPunct="1">
+        <a:defRPr sz="1200" kern="1200">
           <a:solidFill>
             <a:schemeClr val="tx1"/>
           </a:solidFill>
@@ -2978,8 +3336,8 @@
         </p:nvSpPr>
         <p:spPr>
           <a:xfrm>
-            <a:off x="2055046" y="3044857"/>
-            <a:ext cx="829559" cy="820132"/>
+            <a:off x="531050" y="1901860"/>
+            <a:ext cx="829558" cy="820131"/>
           </a:xfrm>
           <a:prstGeom prst="cube">
             <a:avLst/>
@@ -3013,7 +3371,7 @@
           <a:lstStyle/>
           <a:p>
             <a:pPr algn="ctr"/>
-            <a:endParaRPr lang="en-US"/>
+            <a:endParaRPr lang="en-US" sz="1036"/>
           </a:p>
         </p:txBody>
       </p:sp>
@@ -3025,8 +3383,8 @@
         </p:nvSpPr>
         <p:spPr>
           <a:xfrm>
-            <a:off x="1875936" y="2403835"/>
-            <a:ext cx="1187777" cy="369332"/>
+            <a:off x="351942" y="1260834"/>
+            <a:ext cx="1187777" cy="251736"/>
           </a:xfrm>
           <a:prstGeom prst="rect">
             <a:avLst/>
@@ -3041,12 +3399,12 @@
           <a:p>
             <a:pPr algn="ctr"/>
             <a:r>
-              <a:rPr lang="en-US" dirty="0" err="1" smtClean="0">
+              <a:rPr lang="en-US" sz="1036" dirty="0" err="1">
                 <a:latin typeface="Arial Narrow" panose="020B0606020202030204" pitchFamily="34" charset="0"/>
               </a:rPr>
               <a:t>Blackbox</a:t>
             </a:r>
-            <a:endParaRPr lang="en-US" dirty="0">
+            <a:endParaRPr lang="en-US" sz="1036" dirty="0">
               <a:latin typeface="Arial Narrow" panose="020B0606020202030204" pitchFamily="34" charset="0"/>
             </a:endParaRPr>
           </a:p>
@@ -3060,8 +3418,8 @@
         </p:nvSpPr>
         <p:spPr>
           <a:xfrm>
-            <a:off x="3917751" y="2403835"/>
-            <a:ext cx="721672" cy="369332"/>
+            <a:off x="2506766" y="1260834"/>
+            <a:ext cx="495649" cy="251736"/>
           </a:xfrm>
           <a:prstGeom prst="rect">
             <a:avLst/>
@@ -3075,14 +3433,11 @@
           <a:p>
             <a:pPr algn="ctr"/>
             <a:r>
-              <a:rPr lang="en-US" dirty="0" smtClean="0">
+              <a:rPr lang="en-US" sz="1036" dirty="0">
                 <a:latin typeface="Arial Narrow" panose="020B0606020202030204" pitchFamily="34" charset="0"/>
               </a:rPr>
               <a:t>Import</a:t>
             </a:r>
-            <a:endParaRPr lang="en-US" dirty="0">
-              <a:latin typeface="Arial Narrow" panose="020B0606020202030204" pitchFamily="34" charset="0"/>
-            </a:endParaRPr>
           </a:p>
         </p:txBody>
       </p:sp>
@@ -3094,8 +3449,8 @@
         </p:nvSpPr>
         <p:spPr>
           <a:xfrm>
-            <a:off x="8869547" y="2403835"/>
-            <a:ext cx="1670650" cy="369332"/>
+            <a:off x="7660537" y="1260834"/>
+            <a:ext cx="1040670" cy="251736"/>
           </a:xfrm>
           <a:prstGeom prst="rect">
             <a:avLst/>
@@ -3109,14 +3464,11 @@
           <a:p>
             <a:pPr algn="ctr"/>
             <a:r>
-              <a:rPr lang="en-US" dirty="0" smtClean="0">
+              <a:rPr lang="en-US" sz="1036" dirty="0">
                 <a:latin typeface="Arial Narrow" panose="020B0606020202030204" pitchFamily="34" charset="0"/>
               </a:rPr>
               <a:t>Display to Screen</a:t>
             </a:r>
-            <a:endParaRPr lang="en-US" dirty="0">
-              <a:latin typeface="Arial Narrow" panose="020B0606020202030204" pitchFamily="34" charset="0"/>
-            </a:endParaRPr>
           </a:p>
         </p:txBody>
       </p:sp>
@@ -3128,8 +3480,8 @@
         </p:nvSpPr>
         <p:spPr>
           <a:xfrm>
-            <a:off x="5425949" y="2403835"/>
-            <a:ext cx="1322799" cy="369332"/>
+            <a:off x="4143206" y="1260834"/>
+            <a:ext cx="840295" cy="251736"/>
           </a:xfrm>
           <a:prstGeom prst="rect">
             <a:avLst/>
@@ -3143,14 +3495,11 @@
           <a:p>
             <a:pPr algn="ctr"/>
             <a:r>
-              <a:rPr lang="en-US" dirty="0" smtClean="0">
+              <a:rPr lang="en-US" sz="1036" dirty="0">
                 <a:latin typeface="Arial Narrow" panose="020B0606020202030204" pitchFamily="34" charset="0"/>
               </a:rPr>
               <a:t>Process Data</a:t>
             </a:r>
-            <a:endParaRPr lang="en-US" dirty="0">
-              <a:latin typeface="Arial Narrow" panose="020B0606020202030204" pitchFamily="34" charset="0"/>
-            </a:endParaRPr>
           </a:p>
         </p:txBody>
       </p:sp>
@@ -3162,8 +3511,8 @@
         </p:nvSpPr>
         <p:spPr>
           <a:xfrm>
-            <a:off x="7229101" y="2403835"/>
-            <a:ext cx="1334020" cy="369332"/>
+            <a:off x="5947960" y="1260834"/>
+            <a:ext cx="848309" cy="251736"/>
           </a:xfrm>
           <a:prstGeom prst="rect">
             <a:avLst/>
@@ -3177,14 +3526,11 @@
           <a:p>
             <a:pPr algn="ctr"/>
             <a:r>
-              <a:rPr lang="en-US" dirty="0" smtClean="0">
+              <a:rPr lang="en-US" sz="1036" dirty="0">
                 <a:latin typeface="Arial Narrow" panose="020B0606020202030204" pitchFamily="34" charset="0"/>
               </a:rPr>
               <a:t>Create Graph</a:t>
             </a:r>
-            <a:endParaRPr lang="en-US" dirty="0">
-              <a:latin typeface="Arial Narrow" panose="020B0606020202030204" pitchFamily="34" charset="0"/>
-            </a:endParaRPr>
           </a:p>
         </p:txBody>
       </p:sp>
@@ -3196,7 +3542,7 @@
         </p:nvSpPr>
         <p:spPr>
           <a:xfrm>
-            <a:off x="4373837" y="1260741"/>
+            <a:off x="2849841" y="117748"/>
             <a:ext cx="3444341" cy="584775"/>
           </a:xfrm>
           <a:prstGeom prst="rect">
@@ -3211,14 +3557,11 @@
           <a:p>
             <a:pPr algn="ctr"/>
             <a:r>
-              <a:rPr lang="en-US" sz="3200" dirty="0" smtClean="0">
+              <a:rPr lang="en-US" sz="3200" dirty="0">
                 <a:latin typeface="Arial Narrow" panose="020B0606020202030204" pitchFamily="34" charset="0"/>
               </a:rPr>
               <a:t>High-level Abstraction</a:t>
             </a:r>
-            <a:endParaRPr lang="en-US" sz="3200" dirty="0">
-              <a:latin typeface="Arial Narrow" panose="020B0606020202030204" pitchFamily="34" charset="0"/>
-            </a:endParaRPr>
           </a:p>
         </p:txBody>
       </p:sp>
@@ -3230,8 +3573,8 @@
         </p:nvSpPr>
         <p:spPr>
           <a:xfrm>
-            <a:off x="3863808" y="3044857"/>
-            <a:ext cx="829559" cy="820132"/>
+            <a:off x="2339811" y="1901860"/>
+            <a:ext cx="829558" cy="820131"/>
           </a:xfrm>
           <a:prstGeom prst="cube">
             <a:avLst/>
@@ -3263,7 +3606,7 @@
           <a:lstStyle/>
           <a:p>
             <a:pPr algn="ctr"/>
-            <a:endParaRPr lang="en-US"/>
+            <a:endParaRPr lang="en-US" sz="1036"/>
           </a:p>
         </p:txBody>
       </p:sp>
@@ -3275,8 +3618,8 @@
         </p:nvSpPr>
         <p:spPr>
           <a:xfrm>
-            <a:off x="5672570" y="3044857"/>
-            <a:ext cx="829559" cy="820132"/>
+            <a:off x="4148573" y="1901860"/>
+            <a:ext cx="829558" cy="820131"/>
           </a:xfrm>
           <a:prstGeom prst="cube">
             <a:avLst/>
@@ -3308,7 +3651,7 @@
           <a:lstStyle/>
           <a:p>
             <a:pPr algn="ctr"/>
-            <a:endParaRPr lang="en-US"/>
+            <a:endParaRPr lang="en-US" sz="1036"/>
           </a:p>
         </p:txBody>
       </p:sp>
@@ -3320,8 +3663,8 @@
         </p:nvSpPr>
         <p:spPr>
           <a:xfrm>
-            <a:off x="7481332" y="3044857"/>
-            <a:ext cx="829559" cy="820132"/>
+            <a:off x="5957335" y="1901860"/>
+            <a:ext cx="829558" cy="820131"/>
           </a:xfrm>
           <a:prstGeom prst="cube">
             <a:avLst/>
@@ -3353,7 +3696,7 @@
           <a:lstStyle/>
           <a:p>
             <a:pPr algn="ctr"/>
-            <a:endParaRPr lang="en-US"/>
+            <a:endParaRPr lang="en-US" sz="1036"/>
           </a:p>
         </p:txBody>
       </p:sp>
@@ -3365,8 +3708,8 @@
         </p:nvSpPr>
         <p:spPr>
           <a:xfrm>
-            <a:off x="9290093" y="3044857"/>
-            <a:ext cx="829559" cy="820132"/>
+            <a:off x="7766095" y="1901860"/>
+            <a:ext cx="829558" cy="820131"/>
           </a:xfrm>
           <a:prstGeom prst="cube">
             <a:avLst/>
@@ -3398,7 +3741,7 @@
           <a:lstStyle/>
           <a:p>
             <a:pPr algn="ctr"/>
-            <a:endParaRPr lang="en-US"/>
+            <a:endParaRPr lang="en-US" sz="1036"/>
           </a:p>
         </p:txBody>
       </p:sp>
@@ -3413,8 +3756,8 @@
         </p:nvCxnSpPr>
         <p:spPr>
           <a:xfrm>
-            <a:off x="8105858" y="3557440"/>
-            <a:ext cx="1184235" cy="0"/>
+            <a:off x="6581862" y="2414440"/>
+            <a:ext cx="1184234" cy="0"/>
           </a:xfrm>
           <a:prstGeom prst="straightConnector1">
             <a:avLst/>
@@ -3449,7 +3792,7 @@
         </p:nvCxnSpPr>
         <p:spPr>
           <a:xfrm>
-            <a:off x="2679572" y="3557440"/>
+            <a:off x="1155572" y="2414440"/>
             <a:ext cx="1184236" cy="0"/>
           </a:xfrm>
           <a:prstGeom prst="straightConnector1">
@@ -3485,7 +3828,7 @@
         </p:nvCxnSpPr>
         <p:spPr>
           <a:xfrm>
-            <a:off x="4488334" y="3557440"/>
+            <a:off x="2964333" y="2414440"/>
             <a:ext cx="1184236" cy="0"/>
           </a:xfrm>
           <a:prstGeom prst="straightConnector1">
@@ -3521,7 +3864,7 @@
         </p:nvCxnSpPr>
         <p:spPr>
           <a:xfrm>
-            <a:off x="6297096" y="3557440"/>
+            <a:off x="4773095" y="2414440"/>
             <a:ext cx="1184236" cy="0"/>
           </a:xfrm>
           <a:prstGeom prst="straightConnector1">
@@ -3584,8 +3927,8 @@
         </p:nvSpPr>
         <p:spPr>
           <a:xfrm>
-            <a:off x="2055046" y="3440780"/>
-            <a:ext cx="829559" cy="820132"/>
+            <a:off x="531050" y="2297784"/>
+            <a:ext cx="829558" cy="820131"/>
           </a:xfrm>
           <a:prstGeom prst="cube">
             <a:avLst/>
@@ -3619,7 +3962,7 @@
           <a:lstStyle/>
           <a:p>
             <a:pPr algn="ctr"/>
-            <a:endParaRPr lang="en-US"/>
+            <a:endParaRPr lang="en-US" sz="1036"/>
           </a:p>
         </p:txBody>
       </p:sp>
@@ -3631,8 +3974,8 @@
         </p:nvSpPr>
         <p:spPr>
           <a:xfrm>
-            <a:off x="1875936" y="2799758"/>
-            <a:ext cx="1187777" cy="369332"/>
+            <a:off x="273605" y="1656758"/>
+            <a:ext cx="1333621" cy="251736"/>
           </a:xfrm>
           <a:prstGeom prst="rect">
             <a:avLst/>
@@ -3647,14 +3990,11 @@
           <a:p>
             <a:pPr algn="ctr"/>
             <a:r>
-              <a:rPr lang="en-US" b="1" i="1" dirty="0" smtClean="0">
+              <a:rPr lang="en-US" sz="1036" b="1" i="1" dirty="0">
                 <a:latin typeface="Arial Narrow" panose="020B0606020202030204" pitchFamily="34" charset="0"/>
               </a:rPr>
-              <a:t>SQL</a:t>
-            </a:r>
-            <a:endParaRPr lang="en-US" b="1" i="1" dirty="0">
-              <a:latin typeface="Arial Narrow" panose="020B0606020202030204" pitchFamily="34" charset="0"/>
-            </a:endParaRPr>
+              <a:t>PostgreSQL</a:t>
+            </a:r>
           </a:p>
         </p:txBody>
       </p:sp>
@@ -3666,8 +4006,8 @@
         </p:nvSpPr>
         <p:spPr>
           <a:xfrm>
-            <a:off x="3954621" y="2799758"/>
-            <a:ext cx="647934" cy="369332"/>
+            <a:off x="2307192" y="1656758"/>
+            <a:ext cx="894796" cy="251736"/>
           </a:xfrm>
           <a:prstGeom prst="rect">
             <a:avLst/>
@@ -3681,12 +4021,12 @@
           <a:p>
             <a:pPr algn="ctr"/>
             <a:r>
-              <a:rPr lang="en-US" b="1" i="1" dirty="0" err="1" smtClean="0">
+              <a:rPr lang="en-US" sz="1036" b="1" i="1" dirty="0" err="1">
                 <a:latin typeface="Arial Narrow" panose="020B0606020202030204" pitchFamily="34" charset="0"/>
               </a:rPr>
-              <a:t>fread</a:t>
-            </a:r>
-            <a:endParaRPr lang="en-US" b="1" i="1" dirty="0">
+              <a:t>RPostgreSQL</a:t>
+            </a:r>
+            <a:endParaRPr lang="en-US" sz="1036" b="1" i="1" dirty="0">
               <a:latin typeface="Arial Narrow" panose="020B0606020202030204" pitchFamily="34" charset="0"/>
             </a:endParaRPr>
           </a:p>
@@ -3700,8 +4040,8 @@
         </p:nvSpPr>
         <p:spPr>
           <a:xfrm>
-            <a:off x="8869547" y="2430426"/>
-            <a:ext cx="1670650" cy="369332"/>
+            <a:off x="7660537" y="1287427"/>
+            <a:ext cx="1040670" cy="251736"/>
           </a:xfrm>
           <a:prstGeom prst="rect">
             <a:avLst/>
@@ -3715,14 +4055,11 @@
           <a:p>
             <a:pPr algn="ctr"/>
             <a:r>
-              <a:rPr lang="en-US" dirty="0" smtClean="0">
+              <a:rPr lang="en-US" sz="1036" dirty="0">
                 <a:latin typeface="Arial Narrow" panose="020B0606020202030204" pitchFamily="34" charset="0"/>
               </a:rPr>
               <a:t>Display to Screen</a:t>
             </a:r>
-            <a:endParaRPr lang="en-US" dirty="0">
-              <a:latin typeface="Arial Narrow" panose="020B0606020202030204" pitchFamily="34" charset="0"/>
-            </a:endParaRPr>
           </a:p>
         </p:txBody>
       </p:sp>
@@ -3734,8 +4071,8 @@
         </p:nvSpPr>
         <p:spPr>
           <a:xfrm>
-            <a:off x="5425949" y="2430426"/>
-            <a:ext cx="1322799" cy="369332"/>
+            <a:off x="4143206" y="1287427"/>
+            <a:ext cx="840295" cy="251736"/>
           </a:xfrm>
           <a:prstGeom prst="rect">
             <a:avLst/>
@@ -3749,14 +4086,11 @@
           <a:p>
             <a:pPr algn="ctr"/>
             <a:r>
-              <a:rPr lang="en-US" dirty="0" smtClean="0">
+              <a:rPr lang="en-US" sz="1036" dirty="0">
                 <a:latin typeface="Arial Narrow" panose="020B0606020202030204" pitchFamily="34" charset="0"/>
               </a:rPr>
               <a:t>Process Data</a:t>
             </a:r>
-            <a:endParaRPr lang="en-US" dirty="0">
-              <a:latin typeface="Arial Narrow" panose="020B0606020202030204" pitchFamily="34" charset="0"/>
-            </a:endParaRPr>
           </a:p>
         </p:txBody>
       </p:sp>
@@ -3768,8 +4102,8 @@
         </p:nvSpPr>
         <p:spPr>
           <a:xfrm>
-            <a:off x="7229100" y="2430426"/>
-            <a:ext cx="1334020" cy="369332"/>
+            <a:off x="5947960" y="1287427"/>
+            <a:ext cx="848309" cy="251736"/>
           </a:xfrm>
           <a:prstGeom prst="rect">
             <a:avLst/>
@@ -3783,14 +4117,11 @@
           <a:p>
             <a:pPr algn="ctr"/>
             <a:r>
-              <a:rPr lang="en-US" dirty="0" smtClean="0">
+              <a:rPr lang="en-US" sz="1036" dirty="0">
                 <a:latin typeface="Arial Narrow" panose="020B0606020202030204" pitchFamily="34" charset="0"/>
               </a:rPr>
               <a:t>Create Graph</a:t>
             </a:r>
-            <a:endParaRPr lang="en-US" dirty="0">
-              <a:latin typeface="Arial Narrow" panose="020B0606020202030204" pitchFamily="34" charset="0"/>
-            </a:endParaRPr>
           </a:p>
         </p:txBody>
       </p:sp>
@@ -3802,8 +4133,8 @@
         </p:nvSpPr>
         <p:spPr>
           <a:xfrm>
-            <a:off x="4061939" y="1296972"/>
-            <a:ext cx="4063934" cy="584775"/>
+            <a:off x="2537944" y="153978"/>
+            <a:ext cx="4063933" cy="584775"/>
           </a:xfrm>
           <a:prstGeom prst="rect">
             <a:avLst/>
@@ -3817,14 +4148,11 @@
           <a:p>
             <a:pPr algn="ctr"/>
             <a:r>
-              <a:rPr lang="en-US" sz="3200" dirty="0" smtClean="0">
+              <a:rPr lang="en-US" sz="3200" dirty="0">
                 <a:latin typeface="Arial Narrow" panose="020B0606020202030204" pitchFamily="34" charset="0"/>
               </a:rPr>
               <a:t>High-level Representation</a:t>
             </a:r>
-            <a:endParaRPr lang="en-US" sz="3200" dirty="0">
-              <a:latin typeface="Arial Narrow" panose="020B0606020202030204" pitchFamily="34" charset="0"/>
-            </a:endParaRPr>
           </a:p>
         </p:txBody>
       </p:sp>
@@ -3836,8 +4164,8 @@
         </p:nvSpPr>
         <p:spPr>
           <a:xfrm>
-            <a:off x="3863808" y="3440780"/>
-            <a:ext cx="829559" cy="820132"/>
+            <a:off x="2339811" y="2297784"/>
+            <a:ext cx="829558" cy="820131"/>
           </a:xfrm>
           <a:prstGeom prst="cube">
             <a:avLst/>
@@ -3869,7 +4197,7 @@
           <a:lstStyle/>
           <a:p>
             <a:pPr algn="ctr"/>
-            <a:endParaRPr lang="en-US"/>
+            <a:endParaRPr lang="en-US" sz="1036"/>
           </a:p>
         </p:txBody>
       </p:sp>
@@ -3881,8 +4209,8 @@
         </p:nvSpPr>
         <p:spPr>
           <a:xfrm>
-            <a:off x="5672570" y="3440780"/>
-            <a:ext cx="829559" cy="820132"/>
+            <a:off x="4148573" y="2297784"/>
+            <a:ext cx="829558" cy="820131"/>
           </a:xfrm>
           <a:prstGeom prst="cube">
             <a:avLst/>
@@ -3914,7 +4242,7 @@
           <a:lstStyle/>
           <a:p>
             <a:pPr algn="ctr"/>
-            <a:endParaRPr lang="en-US"/>
+            <a:endParaRPr lang="en-US" sz="1036"/>
           </a:p>
         </p:txBody>
       </p:sp>
@@ -3926,8 +4254,8 @@
         </p:nvSpPr>
         <p:spPr>
           <a:xfrm>
-            <a:off x="7481332" y="3440780"/>
-            <a:ext cx="829559" cy="820132"/>
+            <a:off x="5957335" y="2297784"/>
+            <a:ext cx="829558" cy="820131"/>
           </a:xfrm>
           <a:prstGeom prst="cube">
             <a:avLst/>
@@ -3959,7 +4287,7 @@
           <a:lstStyle/>
           <a:p>
             <a:pPr algn="ctr"/>
-            <a:endParaRPr lang="en-US"/>
+            <a:endParaRPr lang="en-US" sz="1036"/>
           </a:p>
         </p:txBody>
       </p:sp>
@@ -3971,8 +4299,8 @@
         </p:nvSpPr>
         <p:spPr>
           <a:xfrm>
-            <a:off x="9290093" y="3440780"/>
-            <a:ext cx="829559" cy="820132"/>
+            <a:off x="7766095" y="2297784"/>
+            <a:ext cx="829558" cy="820131"/>
           </a:xfrm>
           <a:prstGeom prst="cube">
             <a:avLst/>
@@ -4004,7 +4332,7 @@
           <a:lstStyle/>
           <a:p>
             <a:pPr algn="ctr"/>
-            <a:endParaRPr lang="en-US"/>
+            <a:endParaRPr lang="en-US" sz="1036"/>
           </a:p>
         </p:txBody>
       </p:sp>
@@ -4019,8 +4347,8 @@
         </p:nvCxnSpPr>
         <p:spPr>
           <a:xfrm>
-            <a:off x="8105858" y="3953363"/>
-            <a:ext cx="1184235" cy="0"/>
+            <a:off x="6581862" y="2810364"/>
+            <a:ext cx="1184234" cy="0"/>
           </a:xfrm>
           <a:prstGeom prst="straightConnector1">
             <a:avLst/>
@@ -4055,7 +4383,7 @@
         </p:nvCxnSpPr>
         <p:spPr>
           <a:xfrm>
-            <a:off x="2679572" y="3953363"/>
+            <a:off x="1155572" y="2810364"/>
             <a:ext cx="1184236" cy="0"/>
           </a:xfrm>
           <a:prstGeom prst="straightConnector1">
@@ -4091,7 +4419,7 @@
         </p:nvCxnSpPr>
         <p:spPr>
           <a:xfrm>
-            <a:off x="4488334" y="3953363"/>
+            <a:off x="2964333" y="2810364"/>
             <a:ext cx="1184236" cy="0"/>
           </a:xfrm>
           <a:prstGeom prst="straightConnector1">
@@ -4127,7 +4455,7 @@
         </p:nvCxnSpPr>
         <p:spPr>
           <a:xfrm>
-            <a:off x="6297096" y="3953363"/>
+            <a:off x="4773095" y="2810364"/>
             <a:ext cx="1184236" cy="0"/>
           </a:xfrm>
           <a:prstGeom prst="straightConnector1">
@@ -4160,8 +4488,8 @@
         </p:nvSpPr>
         <p:spPr>
           <a:xfrm>
-            <a:off x="8721493" y="2799758"/>
-            <a:ext cx="1966757" cy="369332"/>
+            <a:off x="7570773" y="1656758"/>
+            <a:ext cx="1220206" cy="251736"/>
           </a:xfrm>
           <a:prstGeom prst="rect">
             <a:avLst/>
@@ -4175,14 +4503,11 @@
           <a:p>
             <a:pPr algn="ctr"/>
             <a:r>
-              <a:rPr lang="en-US" b="1" i="1" dirty="0" smtClean="0">
+              <a:rPr lang="en-US" sz="1036" b="1" i="1" dirty="0">
                 <a:latin typeface="Arial Narrow" panose="020B0606020202030204" pitchFamily="34" charset="0"/>
               </a:rPr>
               <a:t>R Shiny Application</a:t>
             </a:r>
-            <a:endParaRPr lang="en-US" b="1" i="1" dirty="0">
-              <a:latin typeface="Arial Narrow" panose="020B0606020202030204" pitchFamily="34" charset="0"/>
-            </a:endParaRPr>
           </a:p>
         </p:txBody>
       </p:sp>
@@ -4194,8 +4519,8 @@
         </p:nvSpPr>
         <p:spPr>
           <a:xfrm>
-            <a:off x="7250164" y="2799758"/>
-            <a:ext cx="1291892" cy="369332"/>
+            <a:off x="5956774" y="1656758"/>
+            <a:ext cx="830676" cy="251736"/>
           </a:xfrm>
           <a:prstGeom prst="rect">
             <a:avLst/>
@@ -4209,26 +4534,23 @@
           <a:p>
             <a:pPr algn="ctr"/>
             <a:r>
-              <a:rPr lang="en-US" b="1" i="1" dirty="0" smtClean="0">
+              <a:rPr lang="en-US" sz="1036" b="1" i="1" dirty="0">
                 <a:latin typeface="Arial Narrow" panose="020B0606020202030204" pitchFamily="34" charset="0"/>
               </a:rPr>
               <a:t>R’s “</a:t>
             </a:r>
             <a:r>
-              <a:rPr lang="en-US" b="1" i="1" dirty="0" err="1" smtClean="0">
+              <a:rPr lang="en-US" sz="1036" b="1" i="1" dirty="0" err="1">
                 <a:latin typeface="Arial Narrow" panose="020B0606020202030204" pitchFamily="34" charset="0"/>
               </a:rPr>
               <a:t>ggplot</a:t>
             </a:r>
             <a:r>
-              <a:rPr lang="en-US" b="1" i="1" dirty="0" smtClean="0">
+              <a:rPr lang="en-US" sz="1036" b="1" i="1" dirty="0">
                 <a:latin typeface="Arial Narrow" panose="020B0606020202030204" pitchFamily="34" charset="0"/>
               </a:rPr>
               <a:t>”</a:t>
             </a:r>
-            <a:endParaRPr lang="en-US" b="1" i="1" dirty="0">
-              <a:latin typeface="Arial Narrow" panose="020B0606020202030204" pitchFamily="34" charset="0"/>
-            </a:endParaRPr>
           </a:p>
         </p:txBody>
       </p:sp>
@@ -4240,8 +4562,8 @@
         </p:nvSpPr>
         <p:spPr>
           <a:xfrm>
-            <a:off x="5648912" y="2799758"/>
-            <a:ext cx="889988" cy="369332"/>
+            <a:off x="4273994" y="1656758"/>
+            <a:ext cx="591829" cy="251736"/>
           </a:xfrm>
           <a:prstGeom prst="rect">
             <a:avLst/>
@@ -4255,14 +4577,11 @@
           <a:p>
             <a:pPr algn="ctr"/>
             <a:r>
-              <a:rPr lang="en-US" b="1" i="1" dirty="0" smtClean="0">
+              <a:rPr lang="en-US" sz="1036" b="1" i="1" dirty="0">
                 <a:latin typeface="Arial Narrow" panose="020B0606020202030204" pitchFamily="34" charset="0"/>
               </a:rPr>
               <a:t>R script</a:t>
             </a:r>
-            <a:endParaRPr lang="en-US" b="1" i="1" dirty="0">
-              <a:latin typeface="Arial Narrow" panose="020B0606020202030204" pitchFamily="34" charset="0"/>
-            </a:endParaRPr>
           </a:p>
         </p:txBody>
       </p:sp>
@@ -4274,8 +4593,8 @@
         </p:nvSpPr>
         <p:spPr>
           <a:xfrm>
-            <a:off x="3917751" y="2430426"/>
-            <a:ext cx="721672" cy="369332"/>
+            <a:off x="2506766" y="1287427"/>
+            <a:ext cx="495649" cy="251736"/>
           </a:xfrm>
           <a:prstGeom prst="rect">
             <a:avLst/>
@@ -4289,14 +4608,11 @@
           <a:p>
             <a:pPr algn="ctr"/>
             <a:r>
-              <a:rPr lang="en-US" dirty="0" smtClean="0">
+              <a:rPr lang="en-US" sz="1036" dirty="0">
                 <a:latin typeface="Arial Narrow" panose="020B0606020202030204" pitchFamily="34" charset="0"/>
               </a:rPr>
               <a:t>Import</a:t>
             </a:r>
-            <a:endParaRPr lang="en-US" dirty="0">
-              <a:latin typeface="Arial Narrow" panose="020B0606020202030204" pitchFamily="34" charset="0"/>
-            </a:endParaRPr>
           </a:p>
         </p:txBody>
       </p:sp>
@@ -4308,8 +4624,8 @@
         </p:nvSpPr>
         <p:spPr>
           <a:xfrm>
-            <a:off x="1878148" y="2430426"/>
-            <a:ext cx="1187777" cy="369332"/>
+            <a:off x="354154" y="1287427"/>
+            <a:ext cx="1187777" cy="251736"/>
           </a:xfrm>
           <a:prstGeom prst="rect">
             <a:avLst/>
@@ -4324,12 +4640,12 @@
           <a:p>
             <a:pPr algn="ctr"/>
             <a:r>
-              <a:rPr lang="en-US" dirty="0" err="1" smtClean="0">
+              <a:rPr lang="en-US" sz="1036" dirty="0" err="1">
                 <a:latin typeface="Arial Narrow" panose="020B0606020202030204" pitchFamily="34" charset="0"/>
               </a:rPr>
               <a:t>Blackbox</a:t>
             </a:r>
-            <a:endParaRPr lang="en-US" dirty="0">
+            <a:endParaRPr lang="en-US" sz="1036" dirty="0">
               <a:latin typeface="Arial Narrow" panose="020B0606020202030204" pitchFamily="34" charset="0"/>
             </a:endParaRPr>
           </a:p>
@@ -4348,7 +4664,1200 @@
 </p:sld>
 </file>
 
+<file path=ppt/slides/slide3.xml><?xml version="1.0" encoding="utf-8"?>
+<p:sld xmlns:a="http://schemas.openxmlformats.org/drawingml/2006/main" xmlns:r="http://schemas.openxmlformats.org/officeDocument/2006/relationships" xmlns:p="http://schemas.openxmlformats.org/presentationml/2006/main">
+  <p:cSld>
+    <p:spTree>
+      <p:nvGrpSpPr>
+        <p:cNvPr id="1" name=""/>
+        <p:cNvGrpSpPr/>
+        <p:nvPr/>
+      </p:nvGrpSpPr>
+      <p:grpSpPr>
+        <a:xfrm>
+          <a:off x="0" y="0"/>
+          <a:ext cx="0" cy="0"/>
+          <a:chOff x="0" y="0"/>
+          <a:chExt cx="0" cy="0"/>
+        </a:xfrm>
+      </p:grpSpPr>
+      <p:sp>
+        <p:nvSpPr>
+          <p:cNvPr id="4" name="Cube 3"/>
+          <p:cNvSpPr/>
+          <p:nvPr/>
+        </p:nvSpPr>
+        <p:spPr>
+          <a:xfrm>
+            <a:off x="531050" y="2297784"/>
+            <a:ext cx="829558" cy="820131"/>
+          </a:xfrm>
+          <a:prstGeom prst="cube">
+            <a:avLst/>
+          </a:prstGeom>
+          <a:effectLst>
+            <a:outerShdw blurRad="50800" dist="38100" dir="2700000" algn="tl" rotWithShape="0">
+              <a:prstClr val="black">
+                <a:alpha val="40000"/>
+              </a:prstClr>
+            </a:outerShdw>
+          </a:effectLst>
+        </p:spPr>
+        <p:style>
+          <a:lnRef idx="2">
+            <a:schemeClr val="dk1">
+              <a:shade val="50000"/>
+            </a:schemeClr>
+          </a:lnRef>
+          <a:fillRef idx="1">
+            <a:schemeClr val="dk1"/>
+          </a:fillRef>
+          <a:effectRef idx="0">
+            <a:schemeClr val="dk1"/>
+          </a:effectRef>
+          <a:fontRef idx="minor">
+            <a:schemeClr val="lt1"/>
+          </a:fontRef>
+        </p:style>
+        <p:txBody>
+          <a:bodyPr rtlCol="0" anchor="ctr"/>
+          <a:lstStyle/>
+          <a:p>
+            <a:pPr algn="ctr"/>
+            <a:endParaRPr lang="en-US" sz="1036"/>
+          </a:p>
+        </p:txBody>
+      </p:sp>
+      <p:sp>
+        <p:nvSpPr>
+          <p:cNvPr id="6" name="TextBox 5"/>
+          <p:cNvSpPr txBox="1"/>
+          <p:nvPr/>
+        </p:nvSpPr>
+        <p:spPr>
+          <a:xfrm>
+            <a:off x="273605" y="1656758"/>
+            <a:ext cx="1333621" cy="251736"/>
+          </a:xfrm>
+          <a:prstGeom prst="rect">
+            <a:avLst/>
+          </a:prstGeom>
+          <a:noFill/>
+        </p:spPr>
+        <p:txBody>
+          <a:bodyPr wrap="square" rtlCol="0">
+            <a:spAutoFit/>
+          </a:bodyPr>
+          <a:lstStyle/>
+          <a:p>
+            <a:pPr algn="ctr"/>
+            <a:r>
+              <a:rPr lang="en-US" sz="1036" b="1" i="1" dirty="0">
+                <a:latin typeface="Arial Narrow" panose="020B0606020202030204" pitchFamily="34" charset="0"/>
+              </a:rPr>
+              <a:t>PostgreSQL</a:t>
+            </a:r>
+          </a:p>
+        </p:txBody>
+      </p:sp>
+      <p:sp>
+        <p:nvSpPr>
+          <p:cNvPr id="7" name="Rectangle 6"/>
+          <p:cNvSpPr/>
+          <p:nvPr/>
+        </p:nvSpPr>
+        <p:spPr>
+          <a:xfrm>
+            <a:off x="2307192" y="1656758"/>
+            <a:ext cx="894796" cy="251736"/>
+          </a:xfrm>
+          <a:prstGeom prst="rect">
+            <a:avLst/>
+          </a:prstGeom>
+        </p:spPr>
+        <p:txBody>
+          <a:bodyPr wrap="none">
+            <a:spAutoFit/>
+          </a:bodyPr>
+          <a:lstStyle/>
+          <a:p>
+            <a:pPr algn="ctr"/>
+            <a:r>
+              <a:rPr lang="en-US" sz="1036" b="1" i="1" dirty="0" err="1">
+                <a:latin typeface="Arial Narrow" panose="020B0606020202030204" pitchFamily="34" charset="0"/>
+              </a:rPr>
+              <a:t>RPostgreSQL</a:t>
+            </a:r>
+            <a:endParaRPr lang="en-US" sz="1036" b="1" i="1" dirty="0">
+              <a:latin typeface="Arial Narrow" panose="020B0606020202030204" pitchFamily="34" charset="0"/>
+            </a:endParaRPr>
+          </a:p>
+        </p:txBody>
+      </p:sp>
+      <p:sp>
+        <p:nvSpPr>
+          <p:cNvPr id="11" name="Rectangle 10"/>
+          <p:cNvSpPr/>
+          <p:nvPr/>
+        </p:nvSpPr>
+        <p:spPr>
+          <a:xfrm>
+            <a:off x="7660537" y="1287427"/>
+            <a:ext cx="1040670" cy="251736"/>
+          </a:xfrm>
+          <a:prstGeom prst="rect">
+            <a:avLst/>
+          </a:prstGeom>
+        </p:spPr>
+        <p:txBody>
+          <a:bodyPr wrap="none">
+            <a:spAutoFit/>
+          </a:bodyPr>
+          <a:lstStyle/>
+          <a:p>
+            <a:pPr algn="ctr"/>
+            <a:r>
+              <a:rPr lang="en-US" sz="1036" dirty="0">
+                <a:latin typeface="Arial Narrow" panose="020B0606020202030204" pitchFamily="34" charset="0"/>
+              </a:rPr>
+              <a:t>Display to Screen</a:t>
+            </a:r>
+          </a:p>
+        </p:txBody>
+      </p:sp>
+      <p:sp>
+        <p:nvSpPr>
+          <p:cNvPr id="13" name="Rectangle 12"/>
+          <p:cNvSpPr/>
+          <p:nvPr/>
+        </p:nvSpPr>
+        <p:spPr>
+          <a:xfrm>
+            <a:off x="4143206" y="1287427"/>
+            <a:ext cx="840295" cy="251736"/>
+          </a:xfrm>
+          <a:prstGeom prst="rect">
+            <a:avLst/>
+          </a:prstGeom>
+        </p:spPr>
+        <p:txBody>
+          <a:bodyPr wrap="none">
+            <a:spAutoFit/>
+          </a:bodyPr>
+          <a:lstStyle/>
+          <a:p>
+            <a:pPr algn="ctr"/>
+            <a:r>
+              <a:rPr lang="en-US" sz="1036" dirty="0">
+                <a:latin typeface="Arial Narrow" panose="020B0606020202030204" pitchFamily="34" charset="0"/>
+              </a:rPr>
+              <a:t>Process Data</a:t>
+            </a:r>
+          </a:p>
+        </p:txBody>
+      </p:sp>
+      <p:sp>
+        <p:nvSpPr>
+          <p:cNvPr id="15" name="Rectangle 14"/>
+          <p:cNvSpPr/>
+          <p:nvPr/>
+        </p:nvSpPr>
+        <p:spPr>
+          <a:xfrm>
+            <a:off x="5947960" y="1287427"/>
+            <a:ext cx="848309" cy="251736"/>
+          </a:xfrm>
+          <a:prstGeom prst="rect">
+            <a:avLst/>
+          </a:prstGeom>
+        </p:spPr>
+        <p:txBody>
+          <a:bodyPr wrap="none">
+            <a:spAutoFit/>
+          </a:bodyPr>
+          <a:lstStyle/>
+          <a:p>
+            <a:pPr algn="ctr"/>
+            <a:r>
+              <a:rPr lang="en-US" sz="1036" dirty="0">
+                <a:latin typeface="Arial Narrow" panose="020B0606020202030204" pitchFamily="34" charset="0"/>
+              </a:rPr>
+              <a:t>Create Graph</a:t>
+            </a:r>
+          </a:p>
+        </p:txBody>
+      </p:sp>
+      <p:sp>
+        <p:nvSpPr>
+          <p:cNvPr id="30" name="Rectangle 29"/>
+          <p:cNvSpPr/>
+          <p:nvPr/>
+        </p:nvSpPr>
+        <p:spPr>
+          <a:xfrm>
+            <a:off x="2537944" y="153978"/>
+            <a:ext cx="4063933" cy="584775"/>
+          </a:xfrm>
+          <a:prstGeom prst="rect">
+            <a:avLst/>
+          </a:prstGeom>
+        </p:spPr>
+        <p:txBody>
+          <a:bodyPr wrap="none" anchor="ctr">
+            <a:spAutoFit/>
+          </a:bodyPr>
+          <a:lstStyle/>
+          <a:p>
+            <a:pPr algn="ctr"/>
+            <a:r>
+              <a:rPr lang="en-US" sz="3200" dirty="0">
+                <a:latin typeface="Arial Narrow" panose="020B0606020202030204" pitchFamily="34" charset="0"/>
+              </a:rPr>
+              <a:t>High-level Representation</a:t>
+            </a:r>
+          </a:p>
+        </p:txBody>
+      </p:sp>
+      <p:sp>
+        <p:nvSpPr>
+          <p:cNvPr id="20" name="Cube 19"/>
+          <p:cNvSpPr/>
+          <p:nvPr/>
+        </p:nvSpPr>
+        <p:spPr>
+          <a:xfrm>
+            <a:off x="2339811" y="2297784"/>
+            <a:ext cx="829558" cy="820131"/>
+          </a:xfrm>
+          <a:prstGeom prst="cube">
+            <a:avLst/>
+          </a:prstGeom>
+          <a:effectLst>
+            <a:outerShdw blurRad="50800" dist="38100" dir="2700000" algn="tl" rotWithShape="0">
+              <a:prstClr val="black">
+                <a:alpha val="40000"/>
+              </a:prstClr>
+            </a:outerShdw>
+          </a:effectLst>
+        </p:spPr>
+        <p:style>
+          <a:lnRef idx="2">
+            <a:schemeClr val="dk1"/>
+          </a:lnRef>
+          <a:fillRef idx="1">
+            <a:schemeClr val="lt1"/>
+          </a:fillRef>
+          <a:effectRef idx="0">
+            <a:schemeClr val="dk1"/>
+          </a:effectRef>
+          <a:fontRef idx="minor">
+            <a:schemeClr val="dk1"/>
+          </a:fontRef>
+        </p:style>
+        <p:txBody>
+          <a:bodyPr rtlCol="0" anchor="ctr"/>
+          <a:lstStyle/>
+          <a:p>
+            <a:pPr algn="ctr"/>
+            <a:endParaRPr lang="en-US" sz="1036"/>
+          </a:p>
+        </p:txBody>
+      </p:sp>
+      <p:sp>
+        <p:nvSpPr>
+          <p:cNvPr id="21" name="Cube 20"/>
+          <p:cNvSpPr/>
+          <p:nvPr/>
+        </p:nvSpPr>
+        <p:spPr>
+          <a:xfrm>
+            <a:off x="4148573" y="2297784"/>
+            <a:ext cx="829558" cy="820131"/>
+          </a:xfrm>
+          <a:prstGeom prst="cube">
+            <a:avLst/>
+          </a:prstGeom>
+          <a:effectLst>
+            <a:outerShdw blurRad="50800" dist="38100" dir="2700000" algn="tl" rotWithShape="0">
+              <a:prstClr val="black">
+                <a:alpha val="40000"/>
+              </a:prstClr>
+            </a:outerShdw>
+          </a:effectLst>
+        </p:spPr>
+        <p:style>
+          <a:lnRef idx="2">
+            <a:schemeClr val="dk1"/>
+          </a:lnRef>
+          <a:fillRef idx="1">
+            <a:schemeClr val="lt1"/>
+          </a:fillRef>
+          <a:effectRef idx="0">
+            <a:schemeClr val="dk1"/>
+          </a:effectRef>
+          <a:fontRef idx="minor">
+            <a:schemeClr val="dk1"/>
+          </a:fontRef>
+        </p:style>
+        <p:txBody>
+          <a:bodyPr rtlCol="0" anchor="ctr"/>
+          <a:lstStyle/>
+          <a:p>
+            <a:pPr algn="ctr"/>
+            <a:endParaRPr lang="en-US" sz="1036"/>
+          </a:p>
+        </p:txBody>
+      </p:sp>
+      <p:sp>
+        <p:nvSpPr>
+          <p:cNvPr id="23" name="Cube 22"/>
+          <p:cNvSpPr/>
+          <p:nvPr/>
+        </p:nvSpPr>
+        <p:spPr>
+          <a:xfrm>
+            <a:off x="5957335" y="2297784"/>
+            <a:ext cx="829558" cy="820131"/>
+          </a:xfrm>
+          <a:prstGeom prst="cube">
+            <a:avLst/>
+          </a:prstGeom>
+          <a:effectLst>
+            <a:outerShdw blurRad="50800" dist="38100" dir="2700000" algn="tl" rotWithShape="0">
+              <a:prstClr val="black">
+                <a:alpha val="40000"/>
+              </a:prstClr>
+            </a:outerShdw>
+          </a:effectLst>
+        </p:spPr>
+        <p:style>
+          <a:lnRef idx="2">
+            <a:schemeClr val="dk1"/>
+          </a:lnRef>
+          <a:fillRef idx="1">
+            <a:schemeClr val="lt1"/>
+          </a:fillRef>
+          <a:effectRef idx="0">
+            <a:schemeClr val="dk1"/>
+          </a:effectRef>
+          <a:fontRef idx="minor">
+            <a:schemeClr val="dk1"/>
+          </a:fontRef>
+        </p:style>
+        <p:txBody>
+          <a:bodyPr rtlCol="0" anchor="ctr"/>
+          <a:lstStyle/>
+          <a:p>
+            <a:pPr algn="ctr"/>
+            <a:endParaRPr lang="en-US" sz="1036"/>
+          </a:p>
+        </p:txBody>
+      </p:sp>
+      <p:sp>
+        <p:nvSpPr>
+          <p:cNvPr id="24" name="Cube 23"/>
+          <p:cNvSpPr/>
+          <p:nvPr/>
+        </p:nvSpPr>
+        <p:spPr>
+          <a:xfrm>
+            <a:off x="7766095" y="2297784"/>
+            <a:ext cx="829558" cy="820131"/>
+          </a:xfrm>
+          <a:prstGeom prst="cube">
+            <a:avLst/>
+          </a:prstGeom>
+          <a:effectLst>
+            <a:outerShdw blurRad="50800" dist="38100" dir="2700000" algn="tl" rotWithShape="0">
+              <a:prstClr val="black">
+                <a:alpha val="40000"/>
+              </a:prstClr>
+            </a:outerShdw>
+          </a:effectLst>
+        </p:spPr>
+        <p:style>
+          <a:lnRef idx="2">
+            <a:schemeClr val="dk1"/>
+          </a:lnRef>
+          <a:fillRef idx="1">
+            <a:schemeClr val="lt1"/>
+          </a:fillRef>
+          <a:effectRef idx="0">
+            <a:schemeClr val="dk1"/>
+          </a:effectRef>
+          <a:fontRef idx="minor">
+            <a:schemeClr val="dk1"/>
+          </a:fontRef>
+        </p:style>
+        <p:txBody>
+          <a:bodyPr rtlCol="0" anchor="ctr"/>
+          <a:lstStyle/>
+          <a:p>
+            <a:pPr algn="ctr"/>
+            <a:endParaRPr lang="en-US" sz="1036"/>
+          </a:p>
+        </p:txBody>
+      </p:sp>
+      <p:cxnSp>
+        <p:nvCxnSpPr>
+          <p:cNvPr id="9" name="Straight Arrow Connector 8"/>
+          <p:cNvCxnSpPr>
+            <a:stCxn id="23" idx="4"/>
+            <a:endCxn id="24" idx="2"/>
+          </p:cNvCxnSpPr>
+          <p:nvPr/>
+        </p:nvCxnSpPr>
+        <p:spPr>
+          <a:xfrm>
+            <a:off x="6581862" y="2810364"/>
+            <a:ext cx="1184234" cy="0"/>
+          </a:xfrm>
+          <a:prstGeom prst="straightConnector1">
+            <a:avLst/>
+          </a:prstGeom>
+          <a:ln>
+            <a:tailEnd type="triangle"/>
+          </a:ln>
+        </p:spPr>
+        <p:style>
+          <a:lnRef idx="1">
+            <a:schemeClr val="dk1"/>
+          </a:lnRef>
+          <a:fillRef idx="0">
+            <a:schemeClr val="dk1"/>
+          </a:fillRef>
+          <a:effectRef idx="0">
+            <a:schemeClr val="dk1"/>
+          </a:effectRef>
+          <a:fontRef idx="minor">
+            <a:schemeClr val="tx1"/>
+          </a:fontRef>
+        </p:style>
+      </p:cxnSp>
+      <p:cxnSp>
+        <p:nvCxnSpPr>
+          <p:cNvPr id="26" name="Straight Arrow Connector 25"/>
+          <p:cNvCxnSpPr>
+            <a:stCxn id="4" idx="4"/>
+            <a:endCxn id="20" idx="2"/>
+          </p:cNvCxnSpPr>
+          <p:nvPr/>
+        </p:nvCxnSpPr>
+        <p:spPr>
+          <a:xfrm>
+            <a:off x="1155572" y="2810364"/>
+            <a:ext cx="1184236" cy="0"/>
+          </a:xfrm>
+          <a:prstGeom prst="straightConnector1">
+            <a:avLst/>
+          </a:prstGeom>
+          <a:ln>
+            <a:tailEnd type="triangle"/>
+          </a:ln>
+        </p:spPr>
+        <p:style>
+          <a:lnRef idx="1">
+            <a:schemeClr val="dk1"/>
+          </a:lnRef>
+          <a:fillRef idx="0">
+            <a:schemeClr val="dk1"/>
+          </a:fillRef>
+          <a:effectRef idx="0">
+            <a:schemeClr val="dk1"/>
+          </a:effectRef>
+          <a:fontRef idx="minor">
+            <a:schemeClr val="tx1"/>
+          </a:fontRef>
+        </p:style>
+      </p:cxnSp>
+      <p:cxnSp>
+        <p:nvCxnSpPr>
+          <p:cNvPr id="31" name="Straight Arrow Connector 30"/>
+          <p:cNvCxnSpPr>
+            <a:stCxn id="20" idx="4"/>
+            <a:endCxn id="21" idx="2"/>
+          </p:cNvCxnSpPr>
+          <p:nvPr/>
+        </p:nvCxnSpPr>
+        <p:spPr>
+          <a:xfrm>
+            <a:off x="2964333" y="2810364"/>
+            <a:ext cx="1184236" cy="0"/>
+          </a:xfrm>
+          <a:prstGeom prst="straightConnector1">
+            <a:avLst/>
+          </a:prstGeom>
+          <a:ln>
+            <a:tailEnd type="triangle"/>
+          </a:ln>
+        </p:spPr>
+        <p:style>
+          <a:lnRef idx="1">
+            <a:schemeClr val="dk1"/>
+          </a:lnRef>
+          <a:fillRef idx="0">
+            <a:schemeClr val="dk1"/>
+          </a:fillRef>
+          <a:effectRef idx="0">
+            <a:schemeClr val="dk1"/>
+          </a:effectRef>
+          <a:fontRef idx="minor">
+            <a:schemeClr val="tx1"/>
+          </a:fontRef>
+        </p:style>
+      </p:cxnSp>
+      <p:cxnSp>
+        <p:nvCxnSpPr>
+          <p:cNvPr id="33" name="Straight Arrow Connector 32"/>
+          <p:cNvCxnSpPr>
+            <a:stCxn id="21" idx="4"/>
+            <a:endCxn id="23" idx="2"/>
+          </p:cNvCxnSpPr>
+          <p:nvPr/>
+        </p:nvCxnSpPr>
+        <p:spPr>
+          <a:xfrm>
+            <a:off x="4773095" y="2810364"/>
+            <a:ext cx="1184236" cy="0"/>
+          </a:xfrm>
+          <a:prstGeom prst="straightConnector1">
+            <a:avLst/>
+          </a:prstGeom>
+          <a:ln>
+            <a:tailEnd type="triangle"/>
+          </a:ln>
+        </p:spPr>
+        <p:style>
+          <a:lnRef idx="1">
+            <a:schemeClr val="dk1"/>
+          </a:lnRef>
+          <a:fillRef idx="0">
+            <a:schemeClr val="dk1"/>
+          </a:fillRef>
+          <a:effectRef idx="0">
+            <a:schemeClr val="dk1"/>
+          </a:effectRef>
+          <a:fontRef idx="minor">
+            <a:schemeClr val="tx1"/>
+          </a:fontRef>
+        </p:style>
+      </p:cxnSp>
+      <p:sp>
+        <p:nvSpPr>
+          <p:cNvPr id="2" name="Rectangle 1"/>
+          <p:cNvSpPr/>
+          <p:nvPr/>
+        </p:nvSpPr>
+        <p:spPr>
+          <a:xfrm>
+            <a:off x="7570773" y="1656758"/>
+            <a:ext cx="1220206" cy="251736"/>
+          </a:xfrm>
+          <a:prstGeom prst="rect">
+            <a:avLst/>
+          </a:prstGeom>
+        </p:spPr>
+        <p:txBody>
+          <a:bodyPr wrap="none">
+            <a:spAutoFit/>
+          </a:bodyPr>
+          <a:lstStyle/>
+          <a:p>
+            <a:pPr algn="ctr"/>
+            <a:r>
+              <a:rPr lang="en-US" sz="1036" b="1" i="1" dirty="0">
+                <a:latin typeface="Arial Narrow" panose="020B0606020202030204" pitchFamily="34" charset="0"/>
+              </a:rPr>
+              <a:t>R Shiny Application</a:t>
+            </a:r>
+          </a:p>
+        </p:txBody>
+      </p:sp>
+      <p:sp>
+        <p:nvSpPr>
+          <p:cNvPr id="18" name="Rectangle 17"/>
+          <p:cNvSpPr/>
+          <p:nvPr/>
+        </p:nvSpPr>
+        <p:spPr>
+          <a:xfrm>
+            <a:off x="5956774" y="1656758"/>
+            <a:ext cx="830676" cy="251736"/>
+          </a:xfrm>
+          <a:prstGeom prst="rect">
+            <a:avLst/>
+          </a:prstGeom>
+        </p:spPr>
+        <p:txBody>
+          <a:bodyPr wrap="none">
+            <a:spAutoFit/>
+          </a:bodyPr>
+          <a:lstStyle/>
+          <a:p>
+            <a:pPr algn="ctr"/>
+            <a:r>
+              <a:rPr lang="en-US" sz="1036" b="1" i="1" dirty="0">
+                <a:latin typeface="Arial Narrow" panose="020B0606020202030204" pitchFamily="34" charset="0"/>
+              </a:rPr>
+              <a:t>R’s “</a:t>
+            </a:r>
+            <a:r>
+              <a:rPr lang="en-US" sz="1036" b="1" i="1" dirty="0" err="1">
+                <a:latin typeface="Arial Narrow" panose="020B0606020202030204" pitchFamily="34" charset="0"/>
+              </a:rPr>
+              <a:t>ggplot</a:t>
+            </a:r>
+            <a:r>
+              <a:rPr lang="en-US" sz="1036" b="1" i="1" dirty="0">
+                <a:latin typeface="Arial Narrow" panose="020B0606020202030204" pitchFamily="34" charset="0"/>
+              </a:rPr>
+              <a:t>”</a:t>
+            </a:r>
+          </a:p>
+        </p:txBody>
+      </p:sp>
+      <p:sp>
+        <p:nvSpPr>
+          <p:cNvPr id="3" name="Rectangle 2"/>
+          <p:cNvSpPr/>
+          <p:nvPr/>
+        </p:nvSpPr>
+        <p:spPr>
+          <a:xfrm>
+            <a:off x="4273994" y="1656758"/>
+            <a:ext cx="591829" cy="251736"/>
+          </a:xfrm>
+          <a:prstGeom prst="rect">
+            <a:avLst/>
+          </a:prstGeom>
+        </p:spPr>
+        <p:txBody>
+          <a:bodyPr wrap="none">
+            <a:spAutoFit/>
+          </a:bodyPr>
+          <a:lstStyle/>
+          <a:p>
+            <a:pPr algn="ctr"/>
+            <a:r>
+              <a:rPr lang="en-US" sz="1036" b="1" i="1" dirty="0">
+                <a:latin typeface="Arial Narrow" panose="020B0606020202030204" pitchFamily="34" charset="0"/>
+              </a:rPr>
+              <a:t>R script</a:t>
+            </a:r>
+          </a:p>
+        </p:txBody>
+      </p:sp>
+      <p:sp>
+        <p:nvSpPr>
+          <p:cNvPr id="22" name="Rectangle 21"/>
+          <p:cNvSpPr/>
+          <p:nvPr/>
+        </p:nvSpPr>
+        <p:spPr>
+          <a:xfrm>
+            <a:off x="2506766" y="1287427"/>
+            <a:ext cx="495649" cy="251736"/>
+          </a:xfrm>
+          <a:prstGeom prst="rect">
+            <a:avLst/>
+          </a:prstGeom>
+        </p:spPr>
+        <p:txBody>
+          <a:bodyPr wrap="none">
+            <a:spAutoFit/>
+          </a:bodyPr>
+          <a:lstStyle/>
+          <a:p>
+            <a:pPr algn="ctr"/>
+            <a:r>
+              <a:rPr lang="en-US" sz="1036" dirty="0">
+                <a:latin typeface="Arial Narrow" panose="020B0606020202030204" pitchFamily="34" charset="0"/>
+              </a:rPr>
+              <a:t>Import</a:t>
+            </a:r>
+          </a:p>
+        </p:txBody>
+      </p:sp>
+      <p:sp>
+        <p:nvSpPr>
+          <p:cNvPr id="25" name="TextBox 24"/>
+          <p:cNvSpPr txBox="1"/>
+          <p:nvPr/>
+        </p:nvSpPr>
+        <p:spPr>
+          <a:xfrm>
+            <a:off x="354154" y="1287427"/>
+            <a:ext cx="1187777" cy="251736"/>
+          </a:xfrm>
+          <a:prstGeom prst="rect">
+            <a:avLst/>
+          </a:prstGeom>
+          <a:noFill/>
+        </p:spPr>
+        <p:txBody>
+          <a:bodyPr wrap="square" rtlCol="0">
+            <a:spAutoFit/>
+          </a:bodyPr>
+          <a:lstStyle/>
+          <a:p>
+            <a:pPr algn="ctr"/>
+            <a:r>
+              <a:rPr lang="en-US" sz="1036" dirty="0" err="1">
+                <a:latin typeface="Arial Narrow" panose="020B0606020202030204" pitchFamily="34" charset="0"/>
+              </a:rPr>
+              <a:t>Blackbox</a:t>
+            </a:r>
+            <a:endParaRPr lang="en-US" sz="1036" dirty="0">
+              <a:latin typeface="Arial Narrow" panose="020B0606020202030204" pitchFamily="34" charset="0"/>
+            </a:endParaRPr>
+          </a:p>
+        </p:txBody>
+      </p:sp>
+      <p:sp>
+        <p:nvSpPr>
+          <p:cNvPr id="27" name="Rectangle 26"/>
+          <p:cNvSpPr/>
+          <p:nvPr/>
+        </p:nvSpPr>
+        <p:spPr>
+          <a:xfrm>
+            <a:off x="531048" y="3498523"/>
+            <a:ext cx="6255846" cy="131975"/>
+          </a:xfrm>
+          <a:prstGeom prst="rect">
+            <a:avLst/>
+          </a:prstGeom>
+          <a:solidFill>
+            <a:schemeClr val="accent2">
+              <a:lumMod val="60000"/>
+              <a:lumOff val="40000"/>
+            </a:schemeClr>
+          </a:solidFill>
+          <a:ln>
+            <a:solidFill>
+              <a:schemeClr val="accent2">
+                <a:lumMod val="60000"/>
+                <a:lumOff val="40000"/>
+              </a:schemeClr>
+            </a:solidFill>
+          </a:ln>
+        </p:spPr>
+        <p:style>
+          <a:lnRef idx="2">
+            <a:schemeClr val="accent1">
+              <a:shade val="50000"/>
+            </a:schemeClr>
+          </a:lnRef>
+          <a:fillRef idx="1">
+            <a:schemeClr val="accent1"/>
+          </a:fillRef>
+          <a:effectRef idx="0">
+            <a:schemeClr val="accent1"/>
+          </a:effectRef>
+          <a:fontRef idx="minor">
+            <a:schemeClr val="lt1"/>
+          </a:fontRef>
+        </p:style>
+        <p:txBody>
+          <a:bodyPr rtlCol="0" anchor="ctr"/>
+          <a:lstStyle/>
+          <a:p>
+            <a:pPr algn="ctr"/>
+            <a:endParaRPr lang="en-US" sz="1036"/>
+          </a:p>
+        </p:txBody>
+      </p:sp>
+      <p:sp>
+        <p:nvSpPr>
+          <p:cNvPr id="28" name="Rectangle 27"/>
+          <p:cNvSpPr/>
+          <p:nvPr/>
+        </p:nvSpPr>
+        <p:spPr>
+          <a:xfrm>
+            <a:off x="7766093" y="3513842"/>
+            <a:ext cx="829558" cy="116655"/>
+          </a:xfrm>
+          <a:prstGeom prst="rect">
+            <a:avLst/>
+          </a:prstGeom>
+          <a:solidFill>
+            <a:schemeClr val="accent1"/>
+          </a:solidFill>
+          <a:ln>
+            <a:solidFill>
+              <a:schemeClr val="accent1"/>
+            </a:solidFill>
+          </a:ln>
+        </p:spPr>
+        <p:style>
+          <a:lnRef idx="2">
+            <a:schemeClr val="accent1">
+              <a:shade val="50000"/>
+            </a:schemeClr>
+          </a:lnRef>
+          <a:fillRef idx="1">
+            <a:schemeClr val="accent1"/>
+          </a:fillRef>
+          <a:effectRef idx="0">
+            <a:schemeClr val="accent1"/>
+          </a:effectRef>
+          <a:fontRef idx="minor">
+            <a:schemeClr val="lt1"/>
+          </a:fontRef>
+        </p:style>
+        <p:txBody>
+          <a:bodyPr rtlCol="0" anchor="ctr"/>
+          <a:lstStyle/>
+          <a:p>
+            <a:pPr algn="ctr"/>
+            <a:endParaRPr lang="en-US" sz="1036"/>
+          </a:p>
+        </p:txBody>
+      </p:sp>
+      <p:sp>
+        <p:nvSpPr>
+          <p:cNvPr id="29" name="Rectangle 28"/>
+          <p:cNvSpPr/>
+          <p:nvPr/>
+        </p:nvSpPr>
+        <p:spPr>
+          <a:xfrm>
+            <a:off x="2973496" y="3319126"/>
+            <a:ext cx="928459" cy="461665"/>
+          </a:xfrm>
+          <a:prstGeom prst="rect">
+            <a:avLst/>
+          </a:prstGeom>
+        </p:spPr>
+        <p:txBody>
+          <a:bodyPr wrap="none">
+            <a:spAutoFit/>
+          </a:bodyPr>
+          <a:lstStyle/>
+          <a:p>
+            <a:pPr algn="ctr"/>
+            <a:r>
+              <a:rPr lang="en-US" sz="2400" dirty="0">
+                <a:latin typeface="Arial Narrow" panose="020B0606020202030204" pitchFamily="34" charset="0"/>
+              </a:rPr>
+              <a:t>Server</a:t>
+            </a:r>
+            <a:endParaRPr lang="en-US" sz="1036" dirty="0">
+              <a:latin typeface="Arial Narrow" panose="020B0606020202030204" pitchFamily="34" charset="0"/>
+            </a:endParaRPr>
+          </a:p>
+        </p:txBody>
+      </p:sp>
+      <p:sp>
+        <p:nvSpPr>
+          <p:cNvPr id="32" name="Rectangle 31"/>
+          <p:cNvSpPr/>
+          <p:nvPr/>
+        </p:nvSpPr>
+        <p:spPr>
+          <a:xfrm>
+            <a:off x="7766095" y="3333677"/>
+            <a:ext cx="832279" cy="461665"/>
+          </a:xfrm>
+          <a:prstGeom prst="rect">
+            <a:avLst/>
+          </a:prstGeom>
+        </p:spPr>
+        <p:txBody>
+          <a:bodyPr wrap="none">
+            <a:spAutoFit/>
+          </a:bodyPr>
+          <a:lstStyle/>
+          <a:p>
+            <a:pPr algn="ctr"/>
+            <a:r>
+              <a:rPr lang="en-US" sz="2400" dirty="0">
+                <a:latin typeface="Arial Narrow" panose="020B0606020202030204" pitchFamily="34" charset="0"/>
+              </a:rPr>
+              <a:t>Client</a:t>
+            </a:r>
+            <a:endParaRPr lang="en-US" sz="1036" dirty="0">
+              <a:latin typeface="Arial Narrow" panose="020B0606020202030204" pitchFamily="34" charset="0"/>
+            </a:endParaRPr>
+          </a:p>
+        </p:txBody>
+      </p:sp>
+    </p:spTree>
+    <p:extLst>
+      <p:ext uri="{BB962C8B-B14F-4D97-AF65-F5344CB8AC3E}">
+        <p14:creationId xmlns:p14="http://schemas.microsoft.com/office/powerpoint/2010/main" val="1615072033"/>
+      </p:ext>
+    </p:extLst>
+  </p:cSld>
+  <p:clrMapOvr>
+    <a:masterClrMapping/>
+  </p:clrMapOvr>
+</p:sld>
+</file>
+
 <file path=ppt/theme/theme1.xml><?xml version="1.0" encoding="utf-8"?>
+<a:theme xmlns:a="http://schemas.openxmlformats.org/drawingml/2006/main" name="Office Theme">
+  <a:themeElements>
+    <a:clrScheme name="Office Theme">
+      <a:dk1>
+        <a:sysClr val="windowText" lastClr="000000"/>
+      </a:dk1>
+      <a:lt1>
+        <a:sysClr val="window" lastClr="FFFFFF"/>
+      </a:lt1>
+      <a:dk2>
+        <a:srgbClr val="44546A"/>
+      </a:dk2>
+      <a:lt2>
+        <a:srgbClr val="E7E6E6"/>
+      </a:lt2>
+      <a:accent1>
+        <a:srgbClr val="5B9BD5"/>
+      </a:accent1>
+      <a:accent2>
+        <a:srgbClr val="ED7D31"/>
+      </a:accent2>
+      <a:accent3>
+        <a:srgbClr val="A5A5A5"/>
+      </a:accent3>
+      <a:accent4>
+        <a:srgbClr val="FFC000"/>
+      </a:accent4>
+      <a:accent5>
+        <a:srgbClr val="4472C4"/>
+      </a:accent5>
+      <a:accent6>
+        <a:srgbClr val="70AD47"/>
+      </a:accent6>
+      <a:hlink>
+        <a:srgbClr val="0563C1"/>
+      </a:hlink>
+      <a:folHlink>
+        <a:srgbClr val="954F72"/>
+      </a:folHlink>
+    </a:clrScheme>
+    <a:fontScheme name="Office Theme">
+      <a:majorFont>
+        <a:latin typeface="Calibri Light" panose="020F0302020204030204"/>
+        <a:ea typeface=""/>
+        <a:cs typeface=""/>
+        <a:font script="Jpan" typeface="ＭＳ Ｐゴシック"/>
+        <a:font script="Hang" typeface="맑은 고딕"/>
+        <a:font script="Hans" typeface="宋体"/>
+        <a:font script="Hant" typeface="新細明體"/>
+        <a:font script="Arab" typeface="Times New Roman"/>
+        <a:font script="Hebr" typeface="Times New Roman"/>
+        <a:font script="Thai" typeface="Angsana New"/>
+        <a:font script="Ethi" typeface="Nyala"/>
+        <a:font script="Beng" typeface="Vrinda"/>
+        <a:font script="Gujr" typeface="Shruti"/>
+        <a:font script="Khmr" typeface="MoolBoran"/>
+        <a:font script="Knda" typeface="Tunga"/>
+        <a:font script="Guru" typeface="Raavi"/>
+        <a:font script="Cans" typeface="Euphemia"/>
+        <a:font script="Cher" typeface="Plantagenet Cherokee"/>
+        <a:font script="Yiii" typeface="Microsoft Yi Baiti"/>
+        <a:font script="Tibt" typeface="Microsoft Himalaya"/>
+        <a:font script="Thaa" typeface="MV Boli"/>
+        <a:font script="Deva" typeface="Mangal"/>
+        <a:font script="Telu" typeface="Gautami"/>
+        <a:font script="Taml" typeface="Latha"/>
+        <a:font script="Syrc" typeface="Estrangelo Edessa"/>
+        <a:font script="Orya" typeface="Kalinga"/>
+        <a:font script="Mlym" typeface="Kartika"/>
+        <a:font script="Laoo" typeface="DokChampa"/>
+        <a:font script="Sinh" typeface="Iskoola Pota"/>
+        <a:font script="Mong" typeface="Mongolian Baiti"/>
+        <a:font script="Viet" typeface="Times New Roman"/>
+        <a:font script="Uigh" typeface="Microsoft Uighur"/>
+        <a:font script="Geor" typeface="Sylfaen"/>
+      </a:majorFont>
+      <a:minorFont>
+        <a:latin typeface="Calibri" panose="020F0502020204030204"/>
+        <a:ea typeface=""/>
+        <a:cs typeface=""/>
+        <a:font script="Jpan" typeface="ＭＳ Ｐゴシック"/>
+        <a:font script="Hang" typeface="맑은 고딕"/>
+        <a:font script="Hans" typeface="宋体"/>
+        <a:font script="Hant" typeface="新細明體"/>
+        <a:font script="Arab" typeface="Arial"/>
+        <a:font script="Hebr" typeface="Arial"/>
+        <a:font script="Thai" typeface="Cordia New"/>
+        <a:font script="Ethi" typeface="Nyala"/>
+        <a:font script="Beng" typeface="Vrinda"/>
+        <a:font script="Gujr" typeface="Shruti"/>
+        <a:font script="Khmr" typeface="DaunPenh"/>
+        <a:font script="Knda" typeface="Tunga"/>
+        <a:font script="Guru" typeface="Raavi"/>
+        <a:font script="Cans" typeface="Euphemia"/>
+        <a:font script="Cher" typeface="Plantagenet Cherokee"/>
+        <a:font script="Yiii" typeface="Microsoft Yi Baiti"/>
+        <a:font script="Tibt" typeface="Microsoft Himalaya"/>
+        <a:font script="Thaa" typeface="MV Boli"/>
+        <a:font script="Deva" typeface="Mangal"/>
+        <a:font script="Telu" typeface="Gautami"/>
+        <a:font script="Taml" typeface="Latha"/>
+        <a:font script="Syrc" typeface="Estrangelo Edessa"/>
+        <a:font script="Orya" typeface="Kalinga"/>
+        <a:font script="Mlym" typeface="Kartika"/>
+        <a:font script="Laoo" typeface="DokChampa"/>
+        <a:font script="Sinh" typeface="Iskoola Pota"/>
+        <a:font script="Mong" typeface="Mongolian Baiti"/>
+        <a:font script="Viet" typeface="Arial"/>
+        <a:font script="Uigh" typeface="Microsoft Uighur"/>
+        <a:font script="Geor" typeface="Sylfaen"/>
+      </a:minorFont>
+    </a:fontScheme>
+    <a:fmtScheme name="Office Theme">
+      <a:fillStyleLst>
+        <a:solidFill>
+          <a:schemeClr val="phClr"/>
+        </a:solidFill>
+        <a:gradFill rotWithShape="1">
+          <a:gsLst>
+            <a:gs pos="0">
+              <a:schemeClr val="phClr">
+                <a:lumMod val="110000"/>
+                <a:satMod val="105000"/>
+                <a:tint val="67000"/>
+              </a:schemeClr>
+            </a:gs>
+            <a:gs pos="50000">
+              <a:schemeClr val="phClr">
+                <a:lumMod val="105000"/>
+                <a:satMod val="103000"/>
+                <a:tint val="73000"/>
+              </a:schemeClr>
+            </a:gs>
+            <a:gs pos="100000">
+              <a:schemeClr val="phClr">
+                <a:lumMod val="105000"/>
+                <a:satMod val="109000"/>
+                <a:tint val="81000"/>
+              </a:schemeClr>
+            </a:gs>
+          </a:gsLst>
+          <a:lin ang="5400000" scaled="0"/>
+        </a:gradFill>
+        <a:gradFill rotWithShape="1">
+          <a:gsLst>
+            <a:gs pos="0">
+              <a:schemeClr val="phClr">
+                <a:satMod val="103000"/>
+                <a:lumMod val="102000"/>
+                <a:tint val="94000"/>
+              </a:schemeClr>
+            </a:gs>
+            <a:gs pos="50000">
+              <a:schemeClr val="phClr">
+                <a:satMod val="110000"/>
+                <a:lumMod val="100000"/>
+                <a:shade val="100000"/>
+              </a:schemeClr>
+            </a:gs>
+            <a:gs pos="100000">
+              <a:schemeClr val="phClr">
+                <a:lumMod val="99000"/>
+                <a:satMod val="120000"/>
+                <a:shade val="78000"/>
+              </a:schemeClr>
+            </a:gs>
+          </a:gsLst>
+          <a:lin ang="5400000" scaled="0"/>
+        </a:gradFill>
+      </a:fillStyleLst>
+      <a:lnStyleLst>
+        <a:ln w="6350" cap="flat" cmpd="sng" algn="ctr">
+          <a:solidFill>
+            <a:schemeClr val="phClr"/>
+          </a:solidFill>
+          <a:prstDash val="solid"/>
+          <a:miter lim="800000"/>
+        </a:ln>
+        <a:ln w="12700" cap="flat" cmpd="sng" algn="ctr">
+          <a:solidFill>
+            <a:schemeClr val="phClr"/>
+          </a:solidFill>
+          <a:prstDash val="solid"/>
+          <a:miter lim="800000"/>
+        </a:ln>
+        <a:ln w="19050" cap="flat" cmpd="sng" algn="ctr">
+          <a:solidFill>
+            <a:schemeClr val="phClr"/>
+          </a:solidFill>
+          <a:prstDash val="solid"/>
+          <a:miter lim="800000"/>
+        </a:ln>
+      </a:lnStyleLst>
+      <a:effectStyleLst>
+        <a:effectStyle>
+          <a:effectLst/>
+        </a:effectStyle>
+        <a:effectStyle>
+          <a:effectLst/>
+        </a:effectStyle>
+        <a:effectStyle>
+          <a:effectLst>
+            <a:outerShdw blurRad="57150" dist="19050" dir="5400000" algn="ctr" rotWithShape="0">
+              <a:srgbClr val="000000">
+                <a:alpha val="63000"/>
+              </a:srgbClr>
+            </a:outerShdw>
+          </a:effectLst>
+        </a:effectStyle>
+      </a:effectStyleLst>
+      <a:bgFillStyleLst>
+        <a:solidFill>
+          <a:schemeClr val="phClr"/>
+        </a:solidFill>
+        <a:solidFill>
+          <a:schemeClr val="phClr">
+            <a:tint val="95000"/>
+            <a:satMod val="170000"/>
+          </a:schemeClr>
+        </a:solidFill>
+        <a:gradFill rotWithShape="1">
+          <a:gsLst>
+            <a:gs pos="0">
+              <a:schemeClr val="phClr">
+                <a:tint val="93000"/>
+                <a:satMod val="150000"/>
+                <a:shade val="98000"/>
+                <a:lumMod val="102000"/>
+              </a:schemeClr>
+            </a:gs>
+            <a:gs pos="50000">
+              <a:schemeClr val="phClr">
+                <a:tint val="98000"/>
+                <a:satMod val="130000"/>
+                <a:shade val="90000"/>
+                <a:lumMod val="103000"/>
+              </a:schemeClr>
+            </a:gs>
+            <a:gs pos="100000">
+              <a:schemeClr val="phClr">
+                <a:shade val="63000"/>
+                <a:satMod val="120000"/>
+              </a:schemeClr>
+            </a:gs>
+          </a:gsLst>
+          <a:lin ang="5400000" scaled="0"/>
+        </a:gradFill>
+      </a:bgFillStyleLst>
+    </a:fmtScheme>
+  </a:themeElements>
+  <a:objectDefaults/>
+  <a:extraClrSchemeLst/>
+  <a:extLst>
+    <a:ext uri="{05A4C25C-085E-4340-85A3-A5531E510DB2}">
+      <thm15:themeFamily xmlns:thm15="http://schemas.microsoft.com/office/thememl/2012/main" name="Office Theme" id="{62F939B6-93AF-4DB8-9C6B-D6C7DFDC589F}" vid="{4A3C46E8-61CC-4603-A589-7422A47A8E4A}"/>
+    </a:ext>
+  </a:extLst>
+</a:theme>
+</file>
+
+<file path=ppt/theme/theme2.xml><?xml version="1.0" encoding="utf-8"?>
 <a:theme xmlns:a="http://schemas.openxmlformats.org/drawingml/2006/main" name="Office Theme">
   <a:themeElements>
     <a:clrScheme name="Office">

</xml_diff>